<commit_message>
Profiling and sequencing figures
</commit_message>
<xml_diff>
--- a/test/figures/figures.pptx
+++ b/test/figures/figures.pptx
@@ -5,11 +5,14 @@
     <p:sldMasterId id="2147483660" r:id="rId1"/>
   </p:sldMasterIdLst>
   <p:notesMasterIdLst>
-    <p:notesMasterId r:id="rId4"/>
+    <p:notesMasterId r:id="rId7"/>
   </p:notesMasterIdLst>
   <p:sldIdLst>
     <p:sldId id="4631" r:id="rId2"/>
     <p:sldId id="4629" r:id="rId3"/>
+    <p:sldId id="4632" r:id="rId4"/>
+    <p:sldId id="4633" r:id="rId5"/>
+    <p:sldId id="4634" r:id="rId6"/>
   </p:sldIdLst>
   <p:sldSz cx="18592800" cy="6858000"/>
   <p:notesSz cx="6858000" cy="9144000"/>
@@ -198,7 +201,7 @@
           <a:p>
             <a:fld id="{52D9FB99-33AF-45C7-9798-F9BB105B9B87}" type="datetimeFigureOut">
               <a:rPr lang="en-US" smtClean="0"/>
-              <a:t>1/20/23</a:t>
+              <a:t>3/20/23</a:t>
             </a:fld>
             <a:endParaRPr lang="en-US"/>
           </a:p>
@@ -609,7 +612,7 @@
           <a:p>
             <a:r>
               <a:rPr lang="en-US" dirty="0" err="1"/>
-              <a:t>throughput.pdf</a:t>
+              <a:t>time_per_read.pdf</a:t>
             </a:r>
             <a:endParaRPr lang="en-US" dirty="0"/>
           </a:p>
@@ -642,6 +645,285 @@
     <p:extLst>
       <p:ext uri="{BB962C8B-B14F-4D97-AF65-F5344CB8AC3E}">
         <p14:creationId xmlns:p14="http://schemas.microsoft.com/office/powerpoint/2010/main" val="493739930"/>
+      </p:ext>
+    </p:extLst>
+  </p:cSld>
+  <p:clrMapOvr>
+    <a:masterClrMapping/>
+  </p:clrMapOvr>
+</p:notes>
+</file>
+
+<file path=ppt/notesSlides/notesSlide3.xml><?xml version="1.0" encoding="utf-8"?>
+<p:notes xmlns:a="http://schemas.openxmlformats.org/drawingml/2006/main" xmlns:r="http://schemas.openxmlformats.org/officeDocument/2006/relationships" xmlns:p="http://schemas.openxmlformats.org/presentationml/2006/main">
+  <p:cSld>
+    <p:spTree>
+      <p:nvGrpSpPr>
+        <p:cNvPr id="1" name=""/>
+        <p:cNvGrpSpPr/>
+        <p:nvPr/>
+      </p:nvGrpSpPr>
+      <p:grpSpPr>
+        <a:xfrm>
+          <a:off x="0" y="0"/>
+          <a:ext cx="0" cy="0"/>
+          <a:chOff x="0" y="0"/>
+          <a:chExt cx="0" cy="0"/>
+        </a:xfrm>
+      </p:grpSpPr>
+      <p:sp>
+        <p:nvSpPr>
+          <p:cNvPr id="2" name="Slide Image Placeholder 1"/>
+          <p:cNvSpPr>
+            <a:spLocks noGrp="1" noRot="1" noChangeAspect="1"/>
+          </p:cNvSpPr>
+          <p:nvPr>
+            <p:ph type="sldImg"/>
+          </p:nvPr>
+        </p:nvSpPr>
+        <p:spPr>
+          <a:xfrm>
+            <a:off x="-754063" y="1143000"/>
+            <a:ext cx="8366126" cy="3086100"/>
+          </a:xfrm>
+        </p:spPr>
+      </p:sp>
+      <p:sp>
+        <p:nvSpPr>
+          <p:cNvPr id="3" name="Notes Placeholder 2"/>
+          <p:cNvSpPr>
+            <a:spLocks noGrp="1"/>
+          </p:cNvSpPr>
+          <p:nvPr>
+            <p:ph type="body" idx="1"/>
+          </p:nvPr>
+        </p:nvSpPr>
+        <p:spPr/>
+        <p:txBody>
+          <a:bodyPr/>
+          <a:lstStyle/>
+          <a:p>
+            <a:r>
+              <a:rPr lang="en-US" dirty="0" err="1"/>
+              <a:t>profiling.pdf</a:t>
+            </a:r>
+            <a:endParaRPr lang="en-US" dirty="0"/>
+          </a:p>
+        </p:txBody>
+      </p:sp>
+      <p:sp>
+        <p:nvSpPr>
+          <p:cNvPr id="4" name="Slide Number Placeholder 3"/>
+          <p:cNvSpPr>
+            <a:spLocks noGrp="1"/>
+          </p:cNvSpPr>
+          <p:nvPr>
+            <p:ph type="sldNum" sz="quarter" idx="5"/>
+          </p:nvPr>
+        </p:nvSpPr>
+        <p:spPr/>
+        <p:txBody>
+          <a:bodyPr/>
+          <a:lstStyle/>
+          <a:p>
+            <a:fld id="{FB8EC415-AB61-4AAF-95EC-A94D821E2AEB}" type="slidenum">
+              <a:rPr lang="en-US" smtClean="0"/>
+              <a:t>3</a:t>
+            </a:fld>
+            <a:endParaRPr lang="en-US"/>
+          </a:p>
+        </p:txBody>
+      </p:sp>
+    </p:spTree>
+    <p:extLst>
+      <p:ext uri="{BB962C8B-B14F-4D97-AF65-F5344CB8AC3E}">
+        <p14:creationId xmlns:p14="http://schemas.microsoft.com/office/powerpoint/2010/main" val="2076121782"/>
+      </p:ext>
+    </p:extLst>
+  </p:cSld>
+  <p:clrMapOvr>
+    <a:masterClrMapping/>
+  </p:clrMapOvr>
+</p:notes>
+</file>
+
+<file path=ppt/notesSlides/notesSlide4.xml><?xml version="1.0" encoding="utf-8"?>
+<p:notes xmlns:a="http://schemas.openxmlformats.org/drawingml/2006/main" xmlns:r="http://schemas.openxmlformats.org/officeDocument/2006/relationships" xmlns:p="http://schemas.openxmlformats.org/presentationml/2006/main">
+  <p:cSld>
+    <p:spTree>
+      <p:nvGrpSpPr>
+        <p:cNvPr id="1" name=""/>
+        <p:cNvGrpSpPr/>
+        <p:nvPr/>
+      </p:nvGrpSpPr>
+      <p:grpSpPr>
+        <a:xfrm>
+          <a:off x="0" y="0"/>
+          <a:ext cx="0" cy="0"/>
+          <a:chOff x="0" y="0"/>
+          <a:chExt cx="0" cy="0"/>
+        </a:xfrm>
+      </p:grpSpPr>
+      <p:sp>
+        <p:nvSpPr>
+          <p:cNvPr id="2" name="Slide Image Placeholder 1"/>
+          <p:cNvSpPr>
+            <a:spLocks noGrp="1" noRot="1" noChangeAspect="1"/>
+          </p:cNvSpPr>
+          <p:nvPr>
+            <p:ph type="sldImg"/>
+          </p:nvPr>
+        </p:nvSpPr>
+        <p:spPr>
+          <a:xfrm>
+            <a:off x="-754063" y="1143000"/>
+            <a:ext cx="8366126" cy="3086100"/>
+          </a:xfrm>
+        </p:spPr>
+      </p:sp>
+      <p:sp>
+        <p:nvSpPr>
+          <p:cNvPr id="3" name="Notes Placeholder 2"/>
+          <p:cNvSpPr>
+            <a:spLocks noGrp="1"/>
+          </p:cNvSpPr>
+          <p:nvPr>
+            <p:ph type="body" idx="1"/>
+          </p:nvPr>
+        </p:nvSpPr>
+        <p:spPr/>
+        <p:txBody>
+          <a:bodyPr/>
+          <a:lstStyle/>
+          <a:p>
+            <a:r>
+              <a:rPr lang="en-US" dirty="0" err="1"/>
+              <a:t>sequenced_bases.pdf</a:t>
+            </a:r>
+            <a:endParaRPr lang="en-US" dirty="0"/>
+          </a:p>
+        </p:txBody>
+      </p:sp>
+      <p:sp>
+        <p:nvSpPr>
+          <p:cNvPr id="4" name="Slide Number Placeholder 3"/>
+          <p:cNvSpPr>
+            <a:spLocks noGrp="1"/>
+          </p:cNvSpPr>
+          <p:nvPr>
+            <p:ph type="sldNum" sz="quarter" idx="5"/>
+          </p:nvPr>
+        </p:nvSpPr>
+        <p:spPr/>
+        <p:txBody>
+          <a:bodyPr/>
+          <a:lstStyle/>
+          <a:p>
+            <a:fld id="{FB8EC415-AB61-4AAF-95EC-A94D821E2AEB}" type="slidenum">
+              <a:rPr lang="en-US" smtClean="0"/>
+              <a:t>4</a:t>
+            </a:fld>
+            <a:endParaRPr lang="en-US"/>
+          </a:p>
+        </p:txBody>
+      </p:sp>
+    </p:spTree>
+    <p:extLst>
+      <p:ext uri="{BB962C8B-B14F-4D97-AF65-F5344CB8AC3E}">
+        <p14:creationId xmlns:p14="http://schemas.microsoft.com/office/powerpoint/2010/main" val="1926209108"/>
+      </p:ext>
+    </p:extLst>
+  </p:cSld>
+  <p:clrMapOvr>
+    <a:masterClrMapping/>
+  </p:clrMapOvr>
+</p:notes>
+</file>
+
+<file path=ppt/notesSlides/notesSlide5.xml><?xml version="1.0" encoding="utf-8"?>
+<p:notes xmlns:a="http://schemas.openxmlformats.org/drawingml/2006/main" xmlns:r="http://schemas.openxmlformats.org/officeDocument/2006/relationships" xmlns:p="http://schemas.openxmlformats.org/presentationml/2006/main">
+  <p:cSld>
+    <p:spTree>
+      <p:nvGrpSpPr>
+        <p:cNvPr id="1" name=""/>
+        <p:cNvGrpSpPr/>
+        <p:nvPr/>
+      </p:nvGrpSpPr>
+      <p:grpSpPr>
+        <a:xfrm>
+          <a:off x="0" y="0"/>
+          <a:ext cx="0" cy="0"/>
+          <a:chOff x="0" y="0"/>
+          <a:chExt cx="0" cy="0"/>
+        </a:xfrm>
+      </p:grpSpPr>
+      <p:sp>
+        <p:nvSpPr>
+          <p:cNvPr id="2" name="Slide Image Placeholder 1"/>
+          <p:cNvSpPr>
+            <a:spLocks noGrp="1" noRot="1" noChangeAspect="1"/>
+          </p:cNvSpPr>
+          <p:nvPr>
+            <p:ph type="sldImg"/>
+          </p:nvPr>
+        </p:nvSpPr>
+        <p:spPr>
+          <a:xfrm>
+            <a:off x="-754063" y="1143000"/>
+            <a:ext cx="8366126" cy="3086100"/>
+          </a:xfrm>
+        </p:spPr>
+      </p:sp>
+      <p:sp>
+        <p:nvSpPr>
+          <p:cNvPr id="3" name="Notes Placeholder 2"/>
+          <p:cNvSpPr>
+            <a:spLocks noGrp="1"/>
+          </p:cNvSpPr>
+          <p:nvPr>
+            <p:ph type="body" idx="1"/>
+          </p:nvPr>
+        </p:nvSpPr>
+        <p:spPr/>
+        <p:txBody>
+          <a:bodyPr/>
+          <a:lstStyle/>
+          <a:p>
+            <a:r>
+              <a:rPr lang="en-US" dirty="0" err="1"/>
+              <a:t>sequenced_chunks.pdf</a:t>
+            </a:r>
+            <a:endParaRPr lang="en-US" dirty="0"/>
+          </a:p>
+        </p:txBody>
+      </p:sp>
+      <p:sp>
+        <p:nvSpPr>
+          <p:cNvPr id="4" name="Slide Number Placeholder 3"/>
+          <p:cNvSpPr>
+            <a:spLocks noGrp="1"/>
+          </p:cNvSpPr>
+          <p:nvPr>
+            <p:ph type="sldNum" sz="quarter" idx="5"/>
+          </p:nvPr>
+        </p:nvSpPr>
+        <p:spPr/>
+        <p:txBody>
+          <a:bodyPr/>
+          <a:lstStyle/>
+          <a:p>
+            <a:fld id="{FB8EC415-AB61-4AAF-95EC-A94D821E2AEB}" type="slidenum">
+              <a:rPr lang="en-US" smtClean="0"/>
+              <a:t>5</a:t>
+            </a:fld>
+            <a:endParaRPr lang="en-US"/>
+          </a:p>
+        </p:txBody>
+      </p:sp>
+    </p:spTree>
+    <p:extLst>
+      <p:ext uri="{BB962C8B-B14F-4D97-AF65-F5344CB8AC3E}">
+        <p14:creationId xmlns:p14="http://schemas.microsoft.com/office/powerpoint/2010/main" val="835592884"/>
       </p:ext>
     </p:extLst>
   </p:cSld>
@@ -782,7 +1064,7 @@
           <a:p>
             <a:fld id="{E3A9BCBE-8A83-4E67-B3B6-D6A7A53377E1}" type="datetimeFigureOut">
               <a:rPr lang="en-US" smtClean="0"/>
-              <a:t>1/20/23</a:t>
+              <a:t>3/20/23</a:t>
             </a:fld>
             <a:endParaRPr lang="en-US"/>
           </a:p>
@@ -952,7 +1234,7 @@
           <a:p>
             <a:fld id="{E3A9BCBE-8A83-4E67-B3B6-D6A7A53377E1}" type="datetimeFigureOut">
               <a:rPr lang="en-US" smtClean="0"/>
-              <a:t>1/20/23</a:t>
+              <a:t>3/20/23</a:t>
             </a:fld>
             <a:endParaRPr lang="en-US"/>
           </a:p>
@@ -1132,7 +1414,7 @@
           <a:p>
             <a:fld id="{E3A9BCBE-8A83-4E67-B3B6-D6A7A53377E1}" type="datetimeFigureOut">
               <a:rPr lang="en-US" smtClean="0"/>
-              <a:t>1/20/23</a:t>
+              <a:t>3/20/23</a:t>
             </a:fld>
             <a:endParaRPr lang="en-US"/>
           </a:p>
@@ -1302,7 +1584,7 @@
           <a:p>
             <a:fld id="{E3A9BCBE-8A83-4E67-B3B6-D6A7A53377E1}" type="datetimeFigureOut">
               <a:rPr lang="en-US" smtClean="0"/>
-              <a:t>1/20/23</a:t>
+              <a:t>3/20/23</a:t>
             </a:fld>
             <a:endParaRPr lang="en-US"/>
           </a:p>
@@ -1548,7 +1830,7 @@
           <a:p>
             <a:fld id="{E3A9BCBE-8A83-4E67-B3B6-D6A7A53377E1}" type="datetimeFigureOut">
               <a:rPr lang="en-US" smtClean="0"/>
-              <a:t>1/20/23</a:t>
+              <a:t>3/20/23</a:t>
             </a:fld>
             <a:endParaRPr lang="en-US"/>
           </a:p>
@@ -1780,7 +2062,7 @@
           <a:p>
             <a:fld id="{E3A9BCBE-8A83-4E67-B3B6-D6A7A53377E1}" type="datetimeFigureOut">
               <a:rPr lang="en-US" smtClean="0"/>
-              <a:t>1/20/23</a:t>
+              <a:t>3/20/23</a:t>
             </a:fld>
             <a:endParaRPr lang="en-US"/>
           </a:p>
@@ -2147,7 +2429,7 @@
           <a:p>
             <a:fld id="{E3A9BCBE-8A83-4E67-B3B6-D6A7A53377E1}" type="datetimeFigureOut">
               <a:rPr lang="en-US" smtClean="0"/>
-              <a:t>1/20/23</a:t>
+              <a:t>3/20/23</a:t>
             </a:fld>
             <a:endParaRPr lang="en-US"/>
           </a:p>
@@ -2265,7 +2547,7 @@
           <a:p>
             <a:fld id="{E3A9BCBE-8A83-4E67-B3B6-D6A7A53377E1}" type="datetimeFigureOut">
               <a:rPr lang="en-US" smtClean="0"/>
-              <a:t>1/20/23</a:t>
+              <a:t>3/20/23</a:t>
             </a:fld>
             <a:endParaRPr lang="en-US"/>
           </a:p>
@@ -2360,7 +2642,7 @@
           <a:p>
             <a:fld id="{E3A9BCBE-8A83-4E67-B3B6-D6A7A53377E1}" type="datetimeFigureOut">
               <a:rPr lang="en-US" smtClean="0"/>
-              <a:t>1/20/23</a:t>
+              <a:t>3/20/23</a:t>
             </a:fld>
             <a:endParaRPr lang="en-US"/>
           </a:p>
@@ -2637,7 +2919,7 @@
           <a:p>
             <a:fld id="{E3A9BCBE-8A83-4E67-B3B6-D6A7A53377E1}" type="datetimeFigureOut">
               <a:rPr lang="en-US" smtClean="0"/>
-              <a:t>1/20/23</a:t>
+              <a:t>3/20/23</a:t>
             </a:fld>
             <a:endParaRPr lang="en-US"/>
           </a:p>
@@ -2894,7 +3176,7 @@
           <a:p>
             <a:fld id="{E3A9BCBE-8A83-4E67-B3B6-D6A7A53377E1}" type="datetimeFigureOut">
               <a:rPr lang="en-US" smtClean="0"/>
-              <a:t>1/20/23</a:t>
+              <a:t>3/20/23</a:t>
             </a:fld>
             <a:endParaRPr lang="en-US"/>
           </a:p>
@@ -3107,7 +3389,7 @@
           <a:p>
             <a:fld id="{E3A9BCBE-8A83-4E67-B3B6-D6A7A53377E1}" type="datetimeFigureOut">
               <a:rPr lang="en-US" smtClean="0"/>
-              <a:t>1/20/23</a:t>
+              <a:t>3/20/23</a:t>
             </a:fld>
             <a:endParaRPr lang="en-US"/>
           </a:p>
@@ -5690,6 +5972,2399 @@
     <p:extLst>
       <p:ext uri="{BB962C8B-B14F-4D97-AF65-F5344CB8AC3E}">
         <p14:creationId xmlns:p14="http://schemas.microsoft.com/office/powerpoint/2010/main" val="3981041560"/>
+      </p:ext>
+    </p:extLst>
+  </p:cSld>
+  <p:clrMapOvr>
+    <a:masterClrMapping/>
+  </p:clrMapOvr>
+</p:sld>
+</file>
+
+<file path=ppt/slides/slide3.xml><?xml version="1.0" encoding="utf-8"?>
+<p:sld xmlns:a="http://schemas.openxmlformats.org/drawingml/2006/main" xmlns:r="http://schemas.openxmlformats.org/officeDocument/2006/relationships" xmlns:p="http://schemas.openxmlformats.org/presentationml/2006/main">
+  <p:cSld>
+    <p:spTree>
+      <p:nvGrpSpPr>
+        <p:cNvPr id="1" name=""/>
+        <p:cNvGrpSpPr/>
+        <p:nvPr/>
+      </p:nvGrpSpPr>
+      <p:grpSpPr>
+        <a:xfrm>
+          <a:off x="0" y="0"/>
+          <a:ext cx="0" cy="0"/>
+          <a:chOff x="0" y="0"/>
+          <a:chExt cx="0" cy="0"/>
+        </a:xfrm>
+      </p:grpSpPr>
+      <p:sp>
+        <p:nvSpPr>
+          <p:cNvPr id="62" name="TextBox 61">
+            <a:extLst>
+              <a:ext uri="{FF2B5EF4-FFF2-40B4-BE49-F238E27FC236}">
+                <a16:creationId xmlns:a16="http://schemas.microsoft.com/office/drawing/2014/main" id="{96CAF229-2FF7-7E51-42EE-3E688EA0A7C5}"/>
+              </a:ext>
+            </a:extLst>
+          </p:cNvPr>
+          <p:cNvSpPr txBox="1"/>
+          <p:nvPr/>
+        </p:nvSpPr>
+        <p:spPr>
+          <a:xfrm>
+            <a:off x="6457607" y="5268410"/>
+            <a:ext cx="931024" cy="1107996"/>
+          </a:xfrm>
+          <a:prstGeom prst="rect">
+            <a:avLst/>
+          </a:prstGeom>
+          <a:noFill/>
+        </p:spPr>
+        <p:txBody>
+          <a:bodyPr wrap="none" rtlCol="0">
+            <a:spAutoFit/>
+          </a:bodyPr>
+          <a:lstStyle/>
+          <a:p>
+            <a:pPr algn="ctr"/>
+            <a:r>
+              <a:rPr lang="en-US" sz="2200" b="1" dirty="0">
+                <a:latin typeface="Cambria" panose="02040503050406030204" pitchFamily="18" charset="0"/>
+              </a:rPr>
+              <a:t>D1</a:t>
+            </a:r>
+          </a:p>
+          <a:p>
+            <a:pPr algn="ctr"/>
+            <a:r>
+              <a:rPr lang="en-US" sz="2200" b="1" dirty="0">
+                <a:latin typeface="Cambria" panose="02040503050406030204" pitchFamily="18" charset="0"/>
+              </a:rPr>
+              <a:t>SARS-</a:t>
+            </a:r>
+          </a:p>
+          <a:p>
+            <a:pPr algn="ctr"/>
+            <a:r>
+              <a:rPr lang="en-US" sz="2200" b="1" dirty="0">
+                <a:latin typeface="Cambria" panose="02040503050406030204" pitchFamily="18" charset="0"/>
+              </a:rPr>
+              <a:t>CoV-2</a:t>
+            </a:r>
+          </a:p>
+        </p:txBody>
+      </p:sp>
+      <p:sp>
+        <p:nvSpPr>
+          <p:cNvPr id="109" name="TextBox 108">
+            <a:extLst>
+              <a:ext uri="{FF2B5EF4-FFF2-40B4-BE49-F238E27FC236}">
+                <a16:creationId xmlns:a16="http://schemas.microsoft.com/office/drawing/2014/main" id="{0B8D124A-38A0-D097-02F7-F0520F16847F}"/>
+              </a:ext>
+            </a:extLst>
+          </p:cNvPr>
+          <p:cNvSpPr txBox="1"/>
+          <p:nvPr/>
+        </p:nvSpPr>
+        <p:spPr>
+          <a:xfrm>
+            <a:off x="9707436" y="5268410"/>
+            <a:ext cx="971060" cy="1107996"/>
+          </a:xfrm>
+          <a:prstGeom prst="rect">
+            <a:avLst/>
+          </a:prstGeom>
+          <a:noFill/>
+        </p:spPr>
+        <p:txBody>
+          <a:bodyPr wrap="square" rtlCol="0">
+            <a:spAutoFit/>
+          </a:bodyPr>
+          <a:lstStyle/>
+          <a:p>
+            <a:pPr algn="ctr"/>
+            <a:r>
+              <a:rPr lang="en-US" sz="2200" b="1" dirty="0">
+                <a:latin typeface="Cambria" panose="02040503050406030204" pitchFamily="18" charset="0"/>
+              </a:rPr>
+              <a:t>D4</a:t>
+            </a:r>
+          </a:p>
+          <a:p>
+            <a:pPr algn="ctr"/>
+            <a:r>
+              <a:rPr lang="en-US" sz="2200" b="1" dirty="0">
+                <a:latin typeface="Cambria" panose="02040503050406030204" pitchFamily="18" charset="0"/>
+              </a:rPr>
+              <a:t>Green</a:t>
+            </a:r>
+          </a:p>
+          <a:p>
+            <a:pPr algn="ctr"/>
+            <a:r>
+              <a:rPr lang="en-US" sz="2200" b="1" dirty="0">
+                <a:latin typeface="Cambria" panose="02040503050406030204" pitchFamily="18" charset="0"/>
+              </a:rPr>
+              <a:t>Algae</a:t>
+            </a:r>
+          </a:p>
+        </p:txBody>
+      </p:sp>
+      <p:sp>
+        <p:nvSpPr>
+          <p:cNvPr id="112" name="TextBox 111">
+            <a:extLst>
+              <a:ext uri="{FF2B5EF4-FFF2-40B4-BE49-F238E27FC236}">
+                <a16:creationId xmlns:a16="http://schemas.microsoft.com/office/drawing/2014/main" id="{21C54195-1BC0-7198-39E9-746027482C71}"/>
+              </a:ext>
+            </a:extLst>
+          </p:cNvPr>
+          <p:cNvSpPr txBox="1"/>
+          <p:nvPr/>
+        </p:nvSpPr>
+        <p:spPr>
+          <a:xfrm>
+            <a:off x="10768862" y="5268410"/>
+            <a:ext cx="1128835" cy="769441"/>
+          </a:xfrm>
+          <a:prstGeom prst="rect">
+            <a:avLst/>
+          </a:prstGeom>
+          <a:noFill/>
+        </p:spPr>
+        <p:txBody>
+          <a:bodyPr wrap="none" rtlCol="0">
+            <a:spAutoFit/>
+          </a:bodyPr>
+          <a:lstStyle/>
+          <a:p>
+            <a:pPr algn="ctr"/>
+            <a:r>
+              <a:rPr lang="en-US" sz="2200" b="1" dirty="0">
+                <a:latin typeface="Cambria" panose="02040503050406030204" pitchFamily="18" charset="0"/>
+              </a:rPr>
+              <a:t>D5</a:t>
+            </a:r>
+          </a:p>
+          <a:p>
+            <a:pPr algn="ctr"/>
+            <a:r>
+              <a:rPr lang="en-US" sz="2200" b="1" dirty="0">
+                <a:latin typeface="Cambria" panose="02040503050406030204" pitchFamily="18" charset="0"/>
+              </a:rPr>
+              <a:t>Human</a:t>
+            </a:r>
+          </a:p>
+        </p:txBody>
+      </p:sp>
+      <p:sp>
+        <p:nvSpPr>
+          <p:cNvPr id="18" name="TextBox 17">
+            <a:extLst>
+              <a:ext uri="{FF2B5EF4-FFF2-40B4-BE49-F238E27FC236}">
+                <a16:creationId xmlns:a16="http://schemas.microsoft.com/office/drawing/2014/main" id="{27D0DFC1-079C-D227-33BF-A2ACDD264B77}"/>
+              </a:ext>
+            </a:extLst>
+          </p:cNvPr>
+          <p:cNvSpPr txBox="1"/>
+          <p:nvPr/>
+        </p:nvSpPr>
+        <p:spPr>
+          <a:xfrm>
+            <a:off x="7533795" y="5268410"/>
+            <a:ext cx="942694" cy="769441"/>
+          </a:xfrm>
+          <a:prstGeom prst="rect">
+            <a:avLst/>
+          </a:prstGeom>
+          <a:noFill/>
+        </p:spPr>
+        <p:txBody>
+          <a:bodyPr wrap="none" rtlCol="0">
+            <a:spAutoFit/>
+          </a:bodyPr>
+          <a:lstStyle/>
+          <a:p>
+            <a:pPr algn="ctr"/>
+            <a:r>
+              <a:rPr lang="en-US" sz="2200" b="1" dirty="0">
+                <a:latin typeface="Cambria" panose="02040503050406030204" pitchFamily="18" charset="0"/>
+              </a:rPr>
+              <a:t>D2</a:t>
+            </a:r>
+          </a:p>
+          <a:p>
+            <a:pPr algn="ctr"/>
+            <a:r>
+              <a:rPr lang="en-US" sz="2200" b="1" dirty="0">
+                <a:latin typeface="Cambria" panose="02040503050406030204" pitchFamily="18" charset="0"/>
+              </a:rPr>
+              <a:t>E. coli</a:t>
+            </a:r>
+          </a:p>
+        </p:txBody>
+      </p:sp>
+      <p:sp>
+        <p:nvSpPr>
+          <p:cNvPr id="19" name="TextBox 18">
+            <a:extLst>
+              <a:ext uri="{FF2B5EF4-FFF2-40B4-BE49-F238E27FC236}">
+                <a16:creationId xmlns:a16="http://schemas.microsoft.com/office/drawing/2014/main" id="{4EE6EC74-399E-623E-683D-91D67EC0EC85}"/>
+              </a:ext>
+            </a:extLst>
+          </p:cNvPr>
+          <p:cNvSpPr txBox="1"/>
+          <p:nvPr/>
+        </p:nvSpPr>
+        <p:spPr>
+          <a:xfrm>
+            <a:off x="8688911" y="5268410"/>
+            <a:ext cx="861967" cy="769441"/>
+          </a:xfrm>
+          <a:prstGeom prst="rect">
+            <a:avLst/>
+          </a:prstGeom>
+          <a:noFill/>
+        </p:spPr>
+        <p:txBody>
+          <a:bodyPr wrap="none" rtlCol="0">
+            <a:spAutoFit/>
+          </a:bodyPr>
+          <a:lstStyle/>
+          <a:p>
+            <a:pPr algn="ctr"/>
+            <a:r>
+              <a:rPr lang="en-US" sz="2200" b="1" dirty="0">
+                <a:latin typeface="Cambria" panose="02040503050406030204" pitchFamily="18" charset="0"/>
+              </a:rPr>
+              <a:t>D3</a:t>
+            </a:r>
+          </a:p>
+          <a:p>
+            <a:pPr algn="ctr"/>
+            <a:r>
+              <a:rPr lang="en-US" sz="2200" b="1" dirty="0">
+                <a:latin typeface="Cambria" panose="02040503050406030204" pitchFamily="18" charset="0"/>
+              </a:rPr>
+              <a:t>Yeast</a:t>
+            </a:r>
+          </a:p>
+        </p:txBody>
+      </p:sp>
+      <p:sp>
+        <p:nvSpPr>
+          <p:cNvPr id="5" name="TextBox 4">
+            <a:extLst>
+              <a:ext uri="{FF2B5EF4-FFF2-40B4-BE49-F238E27FC236}">
+                <a16:creationId xmlns:a16="http://schemas.microsoft.com/office/drawing/2014/main" id="{E4862BF3-9618-6956-E1A9-EA2DE9EC6970}"/>
+              </a:ext>
+            </a:extLst>
+          </p:cNvPr>
+          <p:cNvSpPr txBox="1"/>
+          <p:nvPr/>
+        </p:nvSpPr>
+        <p:spPr>
+          <a:xfrm rot="16200000">
+            <a:off x="3494916" y="2842286"/>
+            <a:ext cx="3796950" cy="800219"/>
+          </a:xfrm>
+          <a:prstGeom prst="rect">
+            <a:avLst/>
+          </a:prstGeom>
+          <a:noFill/>
+        </p:spPr>
+        <p:txBody>
+          <a:bodyPr wrap="square" lIns="0" tIns="0" rIns="0" bIns="0" rtlCol="0">
+            <a:spAutoFit/>
+          </a:bodyPr>
+          <a:lstStyle/>
+          <a:p>
+            <a:pPr algn="ctr"/>
+            <a:r>
+              <a:rPr lang="en-US" sz="2600" b="1" dirty="0">
+                <a:latin typeface="Cambria" panose="02040503050406030204" pitchFamily="18" charset="0"/>
+              </a:rPr>
+              <a:t>Portion of overall  runtime (%)</a:t>
+            </a:r>
+          </a:p>
+        </p:txBody>
+      </p:sp>
+      <p:pic>
+        <p:nvPicPr>
+          <p:cNvPr id="4" name="Picture 3">
+            <a:extLst>
+              <a:ext uri="{FF2B5EF4-FFF2-40B4-BE49-F238E27FC236}">
+                <a16:creationId xmlns:a16="http://schemas.microsoft.com/office/drawing/2014/main" id="{635D8080-B02A-50C5-6025-8CC7DCEC9FEB}"/>
+              </a:ext>
+            </a:extLst>
+          </p:cNvPr>
+          <p:cNvPicPr>
+            <a:picLocks noChangeAspect="1"/>
+          </p:cNvPicPr>
+          <p:nvPr/>
+        </p:nvPicPr>
+        <p:blipFill>
+          <a:blip r:embed="rId3">
+            <a:extLst>
+              <a:ext uri="{28A0092B-C50C-407E-A947-70E740481C1C}">
+                <a14:useLocalDpi xmlns:a14="http://schemas.microsoft.com/office/drawing/2010/main" val="0"/>
+              </a:ext>
+            </a:extLst>
+          </a:blip>
+          <a:srcRect/>
+          <a:stretch/>
+        </p:blipFill>
+        <p:spPr>
+          <a:xfrm>
+            <a:off x="6589018" y="1111180"/>
+            <a:ext cx="5061754" cy="4218129"/>
+          </a:xfrm>
+          <a:prstGeom prst="rect">
+            <a:avLst/>
+          </a:prstGeom>
+        </p:spPr>
+      </p:pic>
+      <p:sp>
+        <p:nvSpPr>
+          <p:cNvPr id="13" name="TextBox 12">
+            <a:extLst>
+              <a:ext uri="{FF2B5EF4-FFF2-40B4-BE49-F238E27FC236}">
+                <a16:creationId xmlns:a16="http://schemas.microsoft.com/office/drawing/2014/main" id="{865CAA05-04A9-47CA-9F71-3D0E31FA797B}"/>
+              </a:ext>
+            </a:extLst>
+          </p:cNvPr>
+          <p:cNvSpPr txBox="1"/>
+          <p:nvPr/>
+        </p:nvSpPr>
+        <p:spPr>
+          <a:xfrm>
+            <a:off x="6158620" y="4388431"/>
+            <a:ext cx="397545" cy="430887"/>
+          </a:xfrm>
+          <a:prstGeom prst="rect">
+            <a:avLst/>
+          </a:prstGeom>
+          <a:noFill/>
+        </p:spPr>
+        <p:txBody>
+          <a:bodyPr wrap="none" lIns="0" tIns="0" rIns="0" bIns="0" rtlCol="0">
+            <a:spAutoFit/>
+          </a:bodyPr>
+          <a:lstStyle/>
+          <a:p>
+            <a:r>
+              <a:rPr lang="en-US" sz="2800" dirty="0">
+                <a:latin typeface="Cambria" panose="02040503050406030204" pitchFamily="18" charset="0"/>
+              </a:rPr>
+              <a:t>75</a:t>
+            </a:r>
+            <a:endParaRPr lang="en-US" sz="2400" baseline="30000" dirty="0">
+              <a:latin typeface="Cambria" panose="02040503050406030204" pitchFamily="18" charset="0"/>
+            </a:endParaRPr>
+          </a:p>
+        </p:txBody>
+      </p:sp>
+      <p:grpSp>
+        <p:nvGrpSpPr>
+          <p:cNvPr id="8" name="Group 7">
+            <a:extLst>
+              <a:ext uri="{FF2B5EF4-FFF2-40B4-BE49-F238E27FC236}">
+                <a16:creationId xmlns:a16="http://schemas.microsoft.com/office/drawing/2014/main" id="{4BAD3F6A-F509-83E6-2991-8DEE6713CA78}"/>
+              </a:ext>
+            </a:extLst>
+          </p:cNvPr>
+          <p:cNvGrpSpPr/>
+          <p:nvPr/>
+        </p:nvGrpSpPr>
+        <p:grpSpPr>
+          <a:xfrm>
+            <a:off x="7244631" y="534386"/>
+            <a:ext cx="3750527" cy="523220"/>
+            <a:chOff x="3780870" y="188601"/>
+            <a:chExt cx="3750527" cy="523220"/>
+          </a:xfrm>
+        </p:grpSpPr>
+        <p:sp>
+          <p:nvSpPr>
+            <p:cNvPr id="82" name="Rectangle 81">
+              <a:extLst>
+                <a:ext uri="{FF2B5EF4-FFF2-40B4-BE49-F238E27FC236}">
+                  <a16:creationId xmlns:a16="http://schemas.microsoft.com/office/drawing/2014/main" id="{FD3CF857-F05E-1745-C00B-A9EAB23F2DA3}"/>
+                </a:ext>
+              </a:extLst>
+            </p:cNvPr>
+            <p:cNvSpPr/>
+            <p:nvPr/>
+          </p:nvSpPr>
+          <p:spPr>
+            <a:xfrm>
+              <a:off x="3780870" y="319463"/>
+              <a:ext cx="288000" cy="288000"/>
+            </a:xfrm>
+            <a:prstGeom prst="rect">
+              <a:avLst/>
+            </a:prstGeom>
+            <a:solidFill>
+              <a:srgbClr val="6799CE"/>
+            </a:solidFill>
+          </p:spPr>
+          <p:style>
+            <a:lnRef idx="2">
+              <a:schemeClr val="accent1">
+                <a:shade val="50000"/>
+              </a:schemeClr>
+            </a:lnRef>
+            <a:fillRef idx="1">
+              <a:schemeClr val="accent1"/>
+            </a:fillRef>
+            <a:effectRef idx="0">
+              <a:schemeClr val="accent1"/>
+            </a:effectRef>
+            <a:fontRef idx="minor">
+              <a:schemeClr val="lt1"/>
+            </a:fontRef>
+          </p:style>
+          <p:txBody>
+            <a:bodyPr rtlCol="0" anchor="ctr"/>
+            <a:lstStyle/>
+            <a:p>
+              <a:pPr algn="ctr"/>
+              <a:endParaRPr lang="en-US" sz="2800" dirty="0">
+                <a:latin typeface="Cambria" panose="02040503050406030204" pitchFamily="18" charset="0"/>
+              </a:endParaRPr>
+            </a:p>
+          </p:txBody>
+        </p:sp>
+        <p:sp>
+          <p:nvSpPr>
+            <p:cNvPr id="83" name="TextBox 82">
+              <a:extLst>
+                <a:ext uri="{FF2B5EF4-FFF2-40B4-BE49-F238E27FC236}">
+                  <a16:creationId xmlns:a16="http://schemas.microsoft.com/office/drawing/2014/main" id="{4F007CFC-AA25-432F-4AE1-4434ACA1316E}"/>
+                </a:ext>
+              </a:extLst>
+            </p:cNvPr>
+            <p:cNvSpPr txBox="1"/>
+            <p:nvPr/>
+          </p:nvSpPr>
+          <p:spPr>
+            <a:xfrm>
+              <a:off x="4058972" y="188601"/>
+              <a:ext cx="3472425" cy="523220"/>
+            </a:xfrm>
+            <a:prstGeom prst="rect">
+              <a:avLst/>
+            </a:prstGeom>
+            <a:noFill/>
+          </p:spPr>
+          <p:txBody>
+            <a:bodyPr wrap="none" rtlCol="0">
+              <a:spAutoFit/>
+            </a:bodyPr>
+            <a:lstStyle/>
+            <a:p>
+              <a:pPr algn="ctr"/>
+              <a:r>
+                <a:rPr lang="en-US" sz="2800" dirty="0">
+                  <a:latin typeface="Cambria" panose="02040503050406030204" pitchFamily="18" charset="0"/>
+                </a:rPr>
+                <a:t>Seeding and Chaining</a:t>
+              </a:r>
+            </a:p>
+          </p:txBody>
+        </p:sp>
+      </p:grpSp>
+      <p:sp>
+        <p:nvSpPr>
+          <p:cNvPr id="2" name="TextBox 1">
+            <a:extLst>
+              <a:ext uri="{FF2B5EF4-FFF2-40B4-BE49-F238E27FC236}">
+                <a16:creationId xmlns:a16="http://schemas.microsoft.com/office/drawing/2014/main" id="{91A39180-8592-55D1-AD2D-1600D2F998B5}"/>
+              </a:ext>
+            </a:extLst>
+          </p:cNvPr>
+          <p:cNvSpPr txBox="1"/>
+          <p:nvPr/>
+        </p:nvSpPr>
+        <p:spPr>
+          <a:xfrm>
+            <a:off x="6158620" y="3698296"/>
+            <a:ext cx="397545" cy="430887"/>
+          </a:xfrm>
+          <a:prstGeom prst="rect">
+            <a:avLst/>
+          </a:prstGeom>
+          <a:noFill/>
+        </p:spPr>
+        <p:txBody>
+          <a:bodyPr wrap="none" lIns="0" tIns="0" rIns="0" bIns="0" rtlCol="0">
+            <a:spAutoFit/>
+          </a:bodyPr>
+          <a:lstStyle/>
+          <a:p>
+            <a:r>
+              <a:rPr lang="en-US" sz="2800" dirty="0">
+                <a:latin typeface="Cambria" panose="02040503050406030204" pitchFamily="18" charset="0"/>
+              </a:rPr>
+              <a:t>80</a:t>
+            </a:r>
+            <a:endParaRPr lang="en-US" sz="2400" baseline="30000" dirty="0">
+              <a:latin typeface="Cambria" panose="02040503050406030204" pitchFamily="18" charset="0"/>
+            </a:endParaRPr>
+          </a:p>
+        </p:txBody>
+      </p:sp>
+      <p:sp>
+        <p:nvSpPr>
+          <p:cNvPr id="9" name="TextBox 8">
+            <a:extLst>
+              <a:ext uri="{FF2B5EF4-FFF2-40B4-BE49-F238E27FC236}">
+                <a16:creationId xmlns:a16="http://schemas.microsoft.com/office/drawing/2014/main" id="{89F23547-0FDB-05D9-2CB8-92EEFCA90D79}"/>
+              </a:ext>
+            </a:extLst>
+          </p:cNvPr>
+          <p:cNvSpPr txBox="1"/>
+          <p:nvPr/>
+        </p:nvSpPr>
+        <p:spPr>
+          <a:xfrm>
+            <a:off x="6158620" y="3008159"/>
+            <a:ext cx="397545" cy="430887"/>
+          </a:xfrm>
+          <a:prstGeom prst="rect">
+            <a:avLst/>
+          </a:prstGeom>
+          <a:noFill/>
+        </p:spPr>
+        <p:txBody>
+          <a:bodyPr wrap="none" lIns="0" tIns="0" rIns="0" bIns="0" rtlCol="0">
+            <a:spAutoFit/>
+          </a:bodyPr>
+          <a:lstStyle/>
+          <a:p>
+            <a:r>
+              <a:rPr lang="en-US" sz="2800" dirty="0">
+                <a:latin typeface="Cambria" panose="02040503050406030204" pitchFamily="18" charset="0"/>
+              </a:rPr>
+              <a:t>85</a:t>
+            </a:r>
+            <a:endParaRPr lang="en-US" sz="2400" baseline="30000" dirty="0">
+              <a:latin typeface="Cambria" panose="02040503050406030204" pitchFamily="18" charset="0"/>
+            </a:endParaRPr>
+          </a:p>
+        </p:txBody>
+      </p:sp>
+      <p:sp>
+        <p:nvSpPr>
+          <p:cNvPr id="10" name="TextBox 9">
+            <a:extLst>
+              <a:ext uri="{FF2B5EF4-FFF2-40B4-BE49-F238E27FC236}">
+                <a16:creationId xmlns:a16="http://schemas.microsoft.com/office/drawing/2014/main" id="{007181AC-CFD0-E695-823A-100CAE8D865E}"/>
+              </a:ext>
+            </a:extLst>
+          </p:cNvPr>
+          <p:cNvSpPr txBox="1"/>
+          <p:nvPr/>
+        </p:nvSpPr>
+        <p:spPr>
+          <a:xfrm>
+            <a:off x="6158620" y="2318022"/>
+            <a:ext cx="397545" cy="430887"/>
+          </a:xfrm>
+          <a:prstGeom prst="rect">
+            <a:avLst/>
+          </a:prstGeom>
+          <a:noFill/>
+        </p:spPr>
+        <p:txBody>
+          <a:bodyPr wrap="none" lIns="0" tIns="0" rIns="0" bIns="0" rtlCol="0">
+            <a:spAutoFit/>
+          </a:bodyPr>
+          <a:lstStyle/>
+          <a:p>
+            <a:r>
+              <a:rPr lang="en-US" sz="2800" dirty="0">
+                <a:latin typeface="Cambria" panose="02040503050406030204" pitchFamily="18" charset="0"/>
+              </a:rPr>
+              <a:t>90</a:t>
+            </a:r>
+            <a:endParaRPr lang="en-US" sz="2400" baseline="30000" dirty="0">
+              <a:latin typeface="Cambria" panose="02040503050406030204" pitchFamily="18" charset="0"/>
+            </a:endParaRPr>
+          </a:p>
+        </p:txBody>
+      </p:sp>
+      <p:sp>
+        <p:nvSpPr>
+          <p:cNvPr id="23" name="TextBox 22">
+            <a:extLst>
+              <a:ext uri="{FF2B5EF4-FFF2-40B4-BE49-F238E27FC236}">
+                <a16:creationId xmlns:a16="http://schemas.microsoft.com/office/drawing/2014/main" id="{D82610FF-ADAB-8BBF-A849-C07818D620BC}"/>
+              </a:ext>
+            </a:extLst>
+          </p:cNvPr>
+          <p:cNvSpPr txBox="1"/>
+          <p:nvPr/>
+        </p:nvSpPr>
+        <p:spPr>
+          <a:xfrm>
+            <a:off x="6158620" y="1627885"/>
+            <a:ext cx="397545" cy="430887"/>
+          </a:xfrm>
+          <a:prstGeom prst="rect">
+            <a:avLst/>
+          </a:prstGeom>
+          <a:noFill/>
+        </p:spPr>
+        <p:txBody>
+          <a:bodyPr wrap="none" lIns="0" tIns="0" rIns="0" bIns="0" rtlCol="0">
+            <a:spAutoFit/>
+          </a:bodyPr>
+          <a:lstStyle/>
+          <a:p>
+            <a:r>
+              <a:rPr lang="en-US" sz="2800" dirty="0">
+                <a:latin typeface="Cambria" panose="02040503050406030204" pitchFamily="18" charset="0"/>
+              </a:rPr>
+              <a:t>95</a:t>
+            </a:r>
+            <a:endParaRPr lang="en-US" sz="2400" baseline="30000" dirty="0">
+              <a:latin typeface="Cambria" panose="02040503050406030204" pitchFamily="18" charset="0"/>
+            </a:endParaRPr>
+          </a:p>
+        </p:txBody>
+      </p:sp>
+      <p:sp>
+        <p:nvSpPr>
+          <p:cNvPr id="24" name="TextBox 23">
+            <a:extLst>
+              <a:ext uri="{FF2B5EF4-FFF2-40B4-BE49-F238E27FC236}">
+                <a16:creationId xmlns:a16="http://schemas.microsoft.com/office/drawing/2014/main" id="{906DDEE3-7CA3-C339-013B-33EB64597431}"/>
+              </a:ext>
+            </a:extLst>
+          </p:cNvPr>
+          <p:cNvSpPr txBox="1"/>
+          <p:nvPr/>
+        </p:nvSpPr>
+        <p:spPr>
+          <a:xfrm>
+            <a:off x="5959848" y="937748"/>
+            <a:ext cx="596317" cy="430887"/>
+          </a:xfrm>
+          <a:prstGeom prst="rect">
+            <a:avLst/>
+          </a:prstGeom>
+          <a:noFill/>
+        </p:spPr>
+        <p:txBody>
+          <a:bodyPr wrap="none" lIns="0" tIns="0" rIns="0" bIns="0" rtlCol="0">
+            <a:spAutoFit/>
+          </a:bodyPr>
+          <a:lstStyle/>
+          <a:p>
+            <a:r>
+              <a:rPr lang="en-US" sz="2800" dirty="0">
+                <a:latin typeface="Cambria" panose="02040503050406030204" pitchFamily="18" charset="0"/>
+              </a:rPr>
+              <a:t>100</a:t>
+            </a:r>
+            <a:endParaRPr lang="en-US" sz="2400" baseline="30000" dirty="0">
+              <a:latin typeface="Cambria" panose="02040503050406030204" pitchFamily="18" charset="0"/>
+            </a:endParaRPr>
+          </a:p>
+        </p:txBody>
+      </p:sp>
+    </p:spTree>
+    <p:extLst>
+      <p:ext uri="{BB962C8B-B14F-4D97-AF65-F5344CB8AC3E}">
+        <p14:creationId xmlns:p14="http://schemas.microsoft.com/office/powerpoint/2010/main" val="3988581533"/>
+      </p:ext>
+    </p:extLst>
+  </p:cSld>
+  <p:clrMapOvr>
+    <a:masterClrMapping/>
+  </p:clrMapOvr>
+</p:sld>
+</file>
+
+<file path=ppt/slides/slide4.xml><?xml version="1.0" encoding="utf-8"?>
+<p:sld xmlns:a="http://schemas.openxmlformats.org/drawingml/2006/main" xmlns:r="http://schemas.openxmlformats.org/officeDocument/2006/relationships" xmlns:p="http://schemas.openxmlformats.org/presentationml/2006/main">
+  <p:cSld>
+    <p:spTree>
+      <p:nvGrpSpPr>
+        <p:cNvPr id="1" name=""/>
+        <p:cNvGrpSpPr/>
+        <p:nvPr/>
+      </p:nvGrpSpPr>
+      <p:grpSpPr>
+        <a:xfrm>
+          <a:off x="0" y="0"/>
+          <a:ext cx="0" cy="0"/>
+          <a:chOff x="0" y="0"/>
+          <a:chExt cx="0" cy="0"/>
+        </a:xfrm>
+      </p:grpSpPr>
+      <p:sp>
+        <p:nvSpPr>
+          <p:cNvPr id="62" name="TextBox 61">
+            <a:extLst>
+              <a:ext uri="{FF2B5EF4-FFF2-40B4-BE49-F238E27FC236}">
+                <a16:creationId xmlns:a16="http://schemas.microsoft.com/office/drawing/2014/main" id="{96CAF229-2FF7-7E51-42EE-3E688EA0A7C5}"/>
+              </a:ext>
+            </a:extLst>
+          </p:cNvPr>
+          <p:cNvSpPr txBox="1"/>
+          <p:nvPr/>
+        </p:nvSpPr>
+        <p:spPr>
+          <a:xfrm>
+            <a:off x="2949127" y="5307764"/>
+            <a:ext cx="1672830" cy="769441"/>
+          </a:xfrm>
+          <a:prstGeom prst="rect">
+            <a:avLst/>
+          </a:prstGeom>
+          <a:noFill/>
+        </p:spPr>
+        <p:txBody>
+          <a:bodyPr wrap="none" rtlCol="0">
+            <a:spAutoFit/>
+          </a:bodyPr>
+          <a:lstStyle/>
+          <a:p>
+            <a:pPr algn="ctr"/>
+            <a:r>
+              <a:rPr lang="en-US" sz="2200" b="1" dirty="0">
+                <a:latin typeface="Cambria" panose="02040503050406030204" pitchFamily="18" charset="0"/>
+              </a:rPr>
+              <a:t>D1</a:t>
+            </a:r>
+          </a:p>
+          <a:p>
+            <a:pPr algn="ctr"/>
+            <a:r>
+              <a:rPr lang="en-US" sz="2200" b="1" dirty="0">
+                <a:latin typeface="Cambria" panose="02040503050406030204" pitchFamily="18" charset="0"/>
+              </a:rPr>
+              <a:t>SARS-CoV-2</a:t>
+            </a:r>
+          </a:p>
+        </p:txBody>
+      </p:sp>
+      <p:sp>
+        <p:nvSpPr>
+          <p:cNvPr id="109" name="TextBox 108">
+            <a:extLst>
+              <a:ext uri="{FF2B5EF4-FFF2-40B4-BE49-F238E27FC236}">
+                <a16:creationId xmlns:a16="http://schemas.microsoft.com/office/drawing/2014/main" id="{0B8D124A-38A0-D097-02F7-F0520F16847F}"/>
+              </a:ext>
+            </a:extLst>
+          </p:cNvPr>
+          <p:cNvSpPr txBox="1"/>
+          <p:nvPr/>
+        </p:nvSpPr>
+        <p:spPr>
+          <a:xfrm>
+            <a:off x="10825150" y="5307764"/>
+            <a:ext cx="1723445" cy="769441"/>
+          </a:xfrm>
+          <a:prstGeom prst="rect">
+            <a:avLst/>
+          </a:prstGeom>
+          <a:noFill/>
+        </p:spPr>
+        <p:txBody>
+          <a:bodyPr wrap="square" rtlCol="0">
+            <a:spAutoFit/>
+          </a:bodyPr>
+          <a:lstStyle/>
+          <a:p>
+            <a:pPr algn="ctr"/>
+            <a:r>
+              <a:rPr lang="en-US" sz="2200" b="1" dirty="0">
+                <a:latin typeface="Cambria" panose="02040503050406030204" pitchFamily="18" charset="0"/>
+              </a:rPr>
+              <a:t>D4</a:t>
+            </a:r>
+          </a:p>
+          <a:p>
+            <a:pPr algn="ctr"/>
+            <a:r>
+              <a:rPr lang="en-US" sz="2200" b="1" dirty="0">
+                <a:latin typeface="Cambria" panose="02040503050406030204" pitchFamily="18" charset="0"/>
+              </a:rPr>
+              <a:t>Green Algae</a:t>
+            </a:r>
+          </a:p>
+        </p:txBody>
+      </p:sp>
+      <p:sp>
+        <p:nvSpPr>
+          <p:cNvPr id="112" name="TextBox 111">
+            <a:extLst>
+              <a:ext uri="{FF2B5EF4-FFF2-40B4-BE49-F238E27FC236}">
+                <a16:creationId xmlns:a16="http://schemas.microsoft.com/office/drawing/2014/main" id="{21C54195-1BC0-7198-39E9-746027482C71}"/>
+              </a:ext>
+            </a:extLst>
+          </p:cNvPr>
+          <p:cNvSpPr txBox="1"/>
+          <p:nvPr/>
+        </p:nvSpPr>
+        <p:spPr>
+          <a:xfrm>
+            <a:off x="13759378" y="5307764"/>
+            <a:ext cx="1128835" cy="769441"/>
+          </a:xfrm>
+          <a:prstGeom prst="rect">
+            <a:avLst/>
+          </a:prstGeom>
+          <a:noFill/>
+        </p:spPr>
+        <p:txBody>
+          <a:bodyPr wrap="none" rtlCol="0">
+            <a:spAutoFit/>
+          </a:bodyPr>
+          <a:lstStyle/>
+          <a:p>
+            <a:pPr algn="ctr"/>
+            <a:r>
+              <a:rPr lang="en-US" sz="2200" b="1" dirty="0">
+                <a:latin typeface="Cambria" panose="02040503050406030204" pitchFamily="18" charset="0"/>
+              </a:rPr>
+              <a:t>D5</a:t>
+            </a:r>
+          </a:p>
+          <a:p>
+            <a:pPr algn="ctr"/>
+            <a:r>
+              <a:rPr lang="en-US" sz="2200" b="1" dirty="0">
+                <a:latin typeface="Cambria" panose="02040503050406030204" pitchFamily="18" charset="0"/>
+              </a:rPr>
+              <a:t>Human</a:t>
+            </a:r>
+          </a:p>
+        </p:txBody>
+      </p:sp>
+      <p:sp>
+        <p:nvSpPr>
+          <p:cNvPr id="18" name="TextBox 17">
+            <a:extLst>
+              <a:ext uri="{FF2B5EF4-FFF2-40B4-BE49-F238E27FC236}">
+                <a16:creationId xmlns:a16="http://schemas.microsoft.com/office/drawing/2014/main" id="{27D0DFC1-079C-D227-33BF-A2ACDD264B77}"/>
+              </a:ext>
+            </a:extLst>
+          </p:cNvPr>
+          <p:cNvSpPr txBox="1"/>
+          <p:nvPr/>
+        </p:nvSpPr>
+        <p:spPr>
+          <a:xfrm>
+            <a:off x="5948463" y="5307764"/>
+            <a:ext cx="942694" cy="769441"/>
+          </a:xfrm>
+          <a:prstGeom prst="rect">
+            <a:avLst/>
+          </a:prstGeom>
+          <a:noFill/>
+        </p:spPr>
+        <p:txBody>
+          <a:bodyPr wrap="none" rtlCol="0">
+            <a:spAutoFit/>
+          </a:bodyPr>
+          <a:lstStyle/>
+          <a:p>
+            <a:pPr algn="ctr"/>
+            <a:r>
+              <a:rPr lang="en-US" sz="2200" b="1" dirty="0">
+                <a:latin typeface="Cambria" panose="02040503050406030204" pitchFamily="18" charset="0"/>
+              </a:rPr>
+              <a:t>D2</a:t>
+            </a:r>
+          </a:p>
+          <a:p>
+            <a:pPr algn="ctr"/>
+            <a:r>
+              <a:rPr lang="en-US" sz="2200" b="1" dirty="0">
+                <a:latin typeface="Cambria" panose="02040503050406030204" pitchFamily="18" charset="0"/>
+              </a:rPr>
+              <a:t>E. coli</a:t>
+            </a:r>
+          </a:p>
+        </p:txBody>
+      </p:sp>
+      <p:sp>
+        <p:nvSpPr>
+          <p:cNvPr id="19" name="TextBox 18">
+            <a:extLst>
+              <a:ext uri="{FF2B5EF4-FFF2-40B4-BE49-F238E27FC236}">
+                <a16:creationId xmlns:a16="http://schemas.microsoft.com/office/drawing/2014/main" id="{4EE6EC74-399E-623E-683D-91D67EC0EC85}"/>
+              </a:ext>
+            </a:extLst>
+          </p:cNvPr>
+          <p:cNvSpPr txBox="1"/>
+          <p:nvPr/>
+        </p:nvSpPr>
+        <p:spPr>
+          <a:xfrm>
+            <a:off x="8627299" y="5307764"/>
+            <a:ext cx="861967" cy="769441"/>
+          </a:xfrm>
+          <a:prstGeom prst="rect">
+            <a:avLst/>
+          </a:prstGeom>
+          <a:noFill/>
+        </p:spPr>
+        <p:txBody>
+          <a:bodyPr wrap="none" rtlCol="0">
+            <a:spAutoFit/>
+          </a:bodyPr>
+          <a:lstStyle/>
+          <a:p>
+            <a:pPr algn="ctr"/>
+            <a:r>
+              <a:rPr lang="en-US" sz="2200" b="1" dirty="0">
+                <a:latin typeface="Cambria" panose="02040503050406030204" pitchFamily="18" charset="0"/>
+              </a:rPr>
+              <a:t>D3</a:t>
+            </a:r>
+          </a:p>
+          <a:p>
+            <a:pPr algn="ctr"/>
+            <a:r>
+              <a:rPr lang="en-US" sz="2200" b="1" dirty="0">
+                <a:latin typeface="Cambria" panose="02040503050406030204" pitchFamily="18" charset="0"/>
+              </a:rPr>
+              <a:t>Yeast</a:t>
+            </a:r>
+          </a:p>
+        </p:txBody>
+      </p:sp>
+      <p:sp>
+        <p:nvSpPr>
+          <p:cNvPr id="5" name="TextBox 4">
+            <a:extLst>
+              <a:ext uri="{FF2B5EF4-FFF2-40B4-BE49-F238E27FC236}">
+                <a16:creationId xmlns:a16="http://schemas.microsoft.com/office/drawing/2014/main" id="{E4862BF3-9618-6956-E1A9-EA2DE9EC6970}"/>
+              </a:ext>
+            </a:extLst>
+          </p:cNvPr>
+          <p:cNvSpPr txBox="1"/>
+          <p:nvPr/>
+        </p:nvSpPr>
+        <p:spPr>
+          <a:xfrm rot="16200000">
+            <a:off x="-491757" y="2820135"/>
+            <a:ext cx="3796950" cy="800219"/>
+          </a:xfrm>
+          <a:prstGeom prst="rect">
+            <a:avLst/>
+          </a:prstGeom>
+          <a:noFill/>
+        </p:spPr>
+        <p:txBody>
+          <a:bodyPr wrap="square" lIns="0" tIns="0" rIns="0" bIns="0" rtlCol="0">
+            <a:spAutoFit/>
+          </a:bodyPr>
+          <a:lstStyle/>
+          <a:p>
+            <a:pPr algn="ctr"/>
+            <a:r>
+              <a:rPr lang="en-US" sz="2600" b="1" dirty="0">
+                <a:latin typeface="Cambria" panose="02040503050406030204" pitchFamily="18" charset="0"/>
+              </a:rPr>
+              <a:t>Average Sequenced Bases per Read (#)</a:t>
+            </a:r>
+          </a:p>
+        </p:txBody>
+      </p:sp>
+      <p:pic>
+        <p:nvPicPr>
+          <p:cNvPr id="4" name="Picture 3">
+            <a:extLst>
+              <a:ext uri="{FF2B5EF4-FFF2-40B4-BE49-F238E27FC236}">
+                <a16:creationId xmlns:a16="http://schemas.microsoft.com/office/drawing/2014/main" id="{635D8080-B02A-50C5-6025-8CC7DCEC9FEB}"/>
+              </a:ext>
+            </a:extLst>
+          </p:cNvPr>
+          <p:cNvPicPr>
+            <a:picLocks noChangeAspect="1"/>
+          </p:cNvPicPr>
+          <p:nvPr/>
+        </p:nvPicPr>
+        <p:blipFill>
+          <a:blip r:embed="rId3">
+            <a:extLst>
+              <a:ext uri="{28A0092B-C50C-407E-A947-70E740481C1C}">
+                <a14:useLocalDpi xmlns:a14="http://schemas.microsoft.com/office/drawing/2010/main" val="0"/>
+              </a:ext>
+            </a:extLst>
+          </a:blip>
+          <a:srcRect/>
+          <a:stretch/>
+        </p:blipFill>
+        <p:spPr>
+          <a:xfrm>
+            <a:off x="2727519" y="1111180"/>
+            <a:ext cx="12654387" cy="4218129"/>
+          </a:xfrm>
+          <a:prstGeom prst="rect">
+            <a:avLst/>
+          </a:prstGeom>
+        </p:spPr>
+      </p:pic>
+      <p:sp>
+        <p:nvSpPr>
+          <p:cNvPr id="13" name="TextBox 12">
+            <a:extLst>
+              <a:ext uri="{FF2B5EF4-FFF2-40B4-BE49-F238E27FC236}">
+                <a16:creationId xmlns:a16="http://schemas.microsoft.com/office/drawing/2014/main" id="{865CAA05-04A9-47CA-9F71-3D0E31FA797B}"/>
+              </a:ext>
+            </a:extLst>
+          </p:cNvPr>
+          <p:cNvSpPr txBox="1"/>
+          <p:nvPr/>
+        </p:nvSpPr>
+        <p:spPr>
+          <a:xfrm>
+            <a:off x="1961735" y="4529367"/>
+            <a:ext cx="795089" cy="430887"/>
+          </a:xfrm>
+          <a:prstGeom prst="rect">
+            <a:avLst/>
+          </a:prstGeom>
+          <a:noFill/>
+        </p:spPr>
+        <p:txBody>
+          <a:bodyPr wrap="none" lIns="0" tIns="0" rIns="0" bIns="0" rtlCol="0">
+            <a:spAutoFit/>
+          </a:bodyPr>
+          <a:lstStyle/>
+          <a:p>
+            <a:r>
+              <a:rPr lang="en-US" sz="2800" dirty="0">
+                <a:latin typeface="Cambria" panose="02040503050406030204" pitchFamily="18" charset="0"/>
+              </a:rPr>
+              <a:t>1000</a:t>
+            </a:r>
+            <a:endParaRPr lang="en-US" sz="2400" baseline="30000" dirty="0">
+              <a:latin typeface="Cambria" panose="02040503050406030204" pitchFamily="18" charset="0"/>
+            </a:endParaRPr>
+          </a:p>
+        </p:txBody>
+      </p:sp>
+      <p:grpSp>
+        <p:nvGrpSpPr>
+          <p:cNvPr id="28" name="Group 27">
+            <a:extLst>
+              <a:ext uri="{FF2B5EF4-FFF2-40B4-BE49-F238E27FC236}">
+                <a16:creationId xmlns:a16="http://schemas.microsoft.com/office/drawing/2014/main" id="{4973AE2D-87AF-4292-24B9-D4D177AC210A}"/>
+              </a:ext>
+            </a:extLst>
+          </p:cNvPr>
+          <p:cNvGrpSpPr/>
+          <p:nvPr/>
+        </p:nvGrpSpPr>
+        <p:grpSpPr>
+          <a:xfrm>
+            <a:off x="6834358" y="587960"/>
+            <a:ext cx="4440709" cy="523220"/>
+            <a:chOff x="5821436" y="584295"/>
+            <a:chExt cx="4440709" cy="523220"/>
+          </a:xfrm>
+        </p:grpSpPr>
+        <p:grpSp>
+          <p:nvGrpSpPr>
+            <p:cNvPr id="8" name="Group 7">
+              <a:extLst>
+                <a:ext uri="{FF2B5EF4-FFF2-40B4-BE49-F238E27FC236}">
+                  <a16:creationId xmlns:a16="http://schemas.microsoft.com/office/drawing/2014/main" id="{4BAD3F6A-F509-83E6-2991-8DEE6713CA78}"/>
+                </a:ext>
+              </a:extLst>
+            </p:cNvPr>
+            <p:cNvGrpSpPr/>
+            <p:nvPr/>
+          </p:nvGrpSpPr>
+          <p:grpSpPr>
+            <a:xfrm>
+              <a:off x="5821436" y="584295"/>
+              <a:ext cx="1859774" cy="523220"/>
+              <a:chOff x="3780870" y="201853"/>
+              <a:chExt cx="1859774" cy="523220"/>
+            </a:xfrm>
+          </p:grpSpPr>
+          <p:sp>
+            <p:nvSpPr>
+              <p:cNvPr id="82" name="Rectangle 81">
+                <a:extLst>
+                  <a:ext uri="{FF2B5EF4-FFF2-40B4-BE49-F238E27FC236}">
+                    <a16:creationId xmlns:a16="http://schemas.microsoft.com/office/drawing/2014/main" id="{FD3CF857-F05E-1745-C00B-A9EAB23F2DA3}"/>
+                  </a:ext>
+                </a:extLst>
+              </p:cNvPr>
+              <p:cNvSpPr/>
+              <p:nvPr/>
+            </p:nvSpPr>
+            <p:spPr>
+              <a:xfrm>
+                <a:off x="3780870" y="319463"/>
+                <a:ext cx="288000" cy="288000"/>
+              </a:xfrm>
+              <a:prstGeom prst="rect">
+                <a:avLst/>
+              </a:prstGeom>
+              <a:solidFill>
+                <a:srgbClr val="6799CE"/>
+              </a:solidFill>
+            </p:spPr>
+            <p:style>
+              <a:lnRef idx="2">
+                <a:schemeClr val="accent1">
+                  <a:shade val="50000"/>
+                </a:schemeClr>
+              </a:lnRef>
+              <a:fillRef idx="1">
+                <a:schemeClr val="accent1"/>
+              </a:fillRef>
+              <a:effectRef idx="0">
+                <a:schemeClr val="accent1"/>
+              </a:effectRef>
+              <a:fontRef idx="minor">
+                <a:schemeClr val="lt1"/>
+              </a:fontRef>
+            </p:style>
+            <p:txBody>
+              <a:bodyPr rtlCol="0" anchor="ctr"/>
+              <a:lstStyle/>
+              <a:p>
+                <a:pPr algn="ctr"/>
+                <a:endParaRPr lang="en-US" sz="2800" dirty="0">
+                  <a:latin typeface="Cambria" panose="02040503050406030204" pitchFamily="18" charset="0"/>
+                </a:endParaRPr>
+              </a:p>
+            </p:txBody>
+          </p:sp>
+          <p:sp>
+            <p:nvSpPr>
+              <p:cNvPr id="83" name="TextBox 82">
+                <a:extLst>
+                  <a:ext uri="{FF2B5EF4-FFF2-40B4-BE49-F238E27FC236}">
+                    <a16:creationId xmlns:a16="http://schemas.microsoft.com/office/drawing/2014/main" id="{4F007CFC-AA25-432F-4AE1-4434ACA1316E}"/>
+                  </a:ext>
+                </a:extLst>
+              </p:cNvPr>
+              <p:cNvSpPr txBox="1"/>
+              <p:nvPr/>
+            </p:nvSpPr>
+            <p:spPr>
+              <a:xfrm>
+                <a:off x="4014430" y="201853"/>
+                <a:ext cx="1626214" cy="523220"/>
+              </a:xfrm>
+              <a:prstGeom prst="rect">
+                <a:avLst/>
+              </a:prstGeom>
+              <a:noFill/>
+            </p:spPr>
+            <p:txBody>
+              <a:bodyPr wrap="none" rtlCol="0">
+                <a:spAutoFit/>
+              </a:bodyPr>
+              <a:lstStyle/>
+              <a:p>
+                <a:pPr algn="ctr"/>
+                <a:r>
+                  <a:rPr lang="en-US" sz="2800" dirty="0" err="1">
+                    <a:latin typeface="Cambria" panose="02040503050406030204" pitchFamily="18" charset="0"/>
+                  </a:rPr>
+                  <a:t>RawHash</a:t>
+                </a:r>
+                <a:endParaRPr lang="en-US" sz="2800" dirty="0">
+                  <a:latin typeface="Cambria" panose="02040503050406030204" pitchFamily="18" charset="0"/>
+                </a:endParaRPr>
+              </a:p>
+            </p:txBody>
+          </p:sp>
+        </p:grpSp>
+        <p:grpSp>
+          <p:nvGrpSpPr>
+            <p:cNvPr id="14" name="Group 13">
+              <a:extLst>
+                <a:ext uri="{FF2B5EF4-FFF2-40B4-BE49-F238E27FC236}">
+                  <a16:creationId xmlns:a16="http://schemas.microsoft.com/office/drawing/2014/main" id="{3AB95315-0052-63BF-1A79-C925E0D836F2}"/>
+                </a:ext>
+              </a:extLst>
+            </p:cNvPr>
+            <p:cNvGrpSpPr/>
+            <p:nvPr/>
+          </p:nvGrpSpPr>
+          <p:grpSpPr>
+            <a:xfrm>
+              <a:off x="8047195" y="584295"/>
+              <a:ext cx="2214950" cy="523220"/>
+              <a:chOff x="3780870" y="248652"/>
+              <a:chExt cx="2214950" cy="523220"/>
+            </a:xfrm>
+          </p:grpSpPr>
+          <p:sp>
+            <p:nvSpPr>
+              <p:cNvPr id="15" name="Rectangle 14">
+                <a:extLst>
+                  <a:ext uri="{FF2B5EF4-FFF2-40B4-BE49-F238E27FC236}">
+                    <a16:creationId xmlns:a16="http://schemas.microsoft.com/office/drawing/2014/main" id="{D70396FF-403B-FFA8-75A5-52BC407761B0}"/>
+                  </a:ext>
+                </a:extLst>
+              </p:cNvPr>
+              <p:cNvSpPr/>
+              <p:nvPr/>
+            </p:nvSpPr>
+            <p:spPr>
+              <a:xfrm>
+                <a:off x="3780870" y="366262"/>
+                <a:ext cx="288000" cy="288000"/>
+              </a:xfrm>
+              <a:prstGeom prst="rect">
+                <a:avLst/>
+              </a:prstGeom>
+              <a:solidFill>
+                <a:srgbClr val="AA449A"/>
+              </a:solidFill>
+            </p:spPr>
+            <p:style>
+              <a:lnRef idx="2">
+                <a:schemeClr val="accent1">
+                  <a:shade val="50000"/>
+                </a:schemeClr>
+              </a:lnRef>
+              <a:fillRef idx="1">
+                <a:schemeClr val="accent1"/>
+              </a:fillRef>
+              <a:effectRef idx="0">
+                <a:schemeClr val="accent1"/>
+              </a:effectRef>
+              <a:fontRef idx="minor">
+                <a:schemeClr val="lt1"/>
+              </a:fontRef>
+            </p:style>
+            <p:txBody>
+              <a:bodyPr rtlCol="0" anchor="ctr"/>
+              <a:lstStyle/>
+              <a:p>
+                <a:pPr algn="ctr"/>
+                <a:endParaRPr lang="en-US" sz="2800" dirty="0">
+                  <a:latin typeface="Cambria" panose="02040503050406030204" pitchFamily="18" charset="0"/>
+                </a:endParaRPr>
+              </a:p>
+            </p:txBody>
+          </p:sp>
+          <p:sp>
+            <p:nvSpPr>
+              <p:cNvPr id="16" name="TextBox 15">
+                <a:extLst>
+                  <a:ext uri="{FF2B5EF4-FFF2-40B4-BE49-F238E27FC236}">
+                    <a16:creationId xmlns:a16="http://schemas.microsoft.com/office/drawing/2014/main" id="{0BCF6713-B3FD-2DAF-EEAA-DADBC32A447A}"/>
+                  </a:ext>
+                </a:extLst>
+              </p:cNvPr>
+              <p:cNvSpPr txBox="1"/>
+              <p:nvPr/>
+            </p:nvSpPr>
+            <p:spPr>
+              <a:xfrm>
+                <a:off x="4079911" y="248652"/>
+                <a:ext cx="1915909" cy="523220"/>
+              </a:xfrm>
+              <a:prstGeom prst="rect">
+                <a:avLst/>
+              </a:prstGeom>
+              <a:noFill/>
+            </p:spPr>
+            <p:txBody>
+              <a:bodyPr wrap="none" rtlCol="0">
+                <a:spAutoFit/>
+              </a:bodyPr>
+              <a:lstStyle/>
+              <a:p>
+                <a:pPr algn="ctr"/>
+                <a:r>
+                  <a:rPr lang="en-US" sz="2800" dirty="0">
+                    <a:latin typeface="Cambria" panose="02040503050406030204" pitchFamily="18" charset="0"/>
+                  </a:rPr>
+                  <a:t>UNCALLED</a:t>
+                </a:r>
+              </a:p>
+            </p:txBody>
+          </p:sp>
+        </p:grpSp>
+      </p:grpSp>
+      <p:sp>
+        <p:nvSpPr>
+          <p:cNvPr id="2" name="TextBox 1">
+            <a:extLst>
+              <a:ext uri="{FF2B5EF4-FFF2-40B4-BE49-F238E27FC236}">
+                <a16:creationId xmlns:a16="http://schemas.microsoft.com/office/drawing/2014/main" id="{D33B48EB-2ADD-ED01-FDD9-F833C8174065}"/>
+              </a:ext>
+            </a:extLst>
+          </p:cNvPr>
+          <p:cNvSpPr txBox="1"/>
+          <p:nvPr/>
+        </p:nvSpPr>
+        <p:spPr>
+          <a:xfrm>
+            <a:off x="1961735" y="3987880"/>
+            <a:ext cx="795089" cy="430887"/>
+          </a:xfrm>
+          <a:prstGeom prst="rect">
+            <a:avLst/>
+          </a:prstGeom>
+          <a:noFill/>
+        </p:spPr>
+        <p:txBody>
+          <a:bodyPr wrap="none" lIns="0" tIns="0" rIns="0" bIns="0" rtlCol="0">
+            <a:spAutoFit/>
+          </a:bodyPr>
+          <a:lstStyle/>
+          <a:p>
+            <a:r>
+              <a:rPr lang="en-US" sz="2800" dirty="0">
+                <a:latin typeface="Cambria" panose="02040503050406030204" pitchFamily="18" charset="0"/>
+              </a:rPr>
+              <a:t>2000</a:t>
+            </a:r>
+            <a:endParaRPr lang="en-US" sz="2400" baseline="30000" dirty="0">
+              <a:latin typeface="Cambria" panose="02040503050406030204" pitchFamily="18" charset="0"/>
+            </a:endParaRPr>
+          </a:p>
+        </p:txBody>
+      </p:sp>
+      <p:sp>
+        <p:nvSpPr>
+          <p:cNvPr id="9" name="TextBox 8">
+            <a:extLst>
+              <a:ext uri="{FF2B5EF4-FFF2-40B4-BE49-F238E27FC236}">
+                <a16:creationId xmlns:a16="http://schemas.microsoft.com/office/drawing/2014/main" id="{DA69F3CE-7D15-E2FA-29AD-4077E361F1F2}"/>
+              </a:ext>
+            </a:extLst>
+          </p:cNvPr>
+          <p:cNvSpPr txBox="1"/>
+          <p:nvPr/>
+        </p:nvSpPr>
+        <p:spPr>
+          <a:xfrm>
+            <a:off x="1961735" y="3446392"/>
+            <a:ext cx="795089" cy="430887"/>
+          </a:xfrm>
+          <a:prstGeom prst="rect">
+            <a:avLst/>
+          </a:prstGeom>
+          <a:noFill/>
+        </p:spPr>
+        <p:txBody>
+          <a:bodyPr wrap="none" lIns="0" tIns="0" rIns="0" bIns="0" rtlCol="0">
+            <a:spAutoFit/>
+          </a:bodyPr>
+          <a:lstStyle/>
+          <a:p>
+            <a:r>
+              <a:rPr lang="en-US" sz="2800" dirty="0">
+                <a:latin typeface="Cambria" panose="02040503050406030204" pitchFamily="18" charset="0"/>
+              </a:rPr>
+              <a:t>3000</a:t>
+            </a:r>
+            <a:endParaRPr lang="en-US" sz="2400" baseline="30000" dirty="0">
+              <a:latin typeface="Cambria" panose="02040503050406030204" pitchFamily="18" charset="0"/>
+            </a:endParaRPr>
+          </a:p>
+        </p:txBody>
+      </p:sp>
+      <p:sp>
+        <p:nvSpPr>
+          <p:cNvPr id="10" name="TextBox 9">
+            <a:extLst>
+              <a:ext uri="{FF2B5EF4-FFF2-40B4-BE49-F238E27FC236}">
+                <a16:creationId xmlns:a16="http://schemas.microsoft.com/office/drawing/2014/main" id="{011FBACF-95D4-30B5-5500-0AEA1AC9608F}"/>
+              </a:ext>
+            </a:extLst>
+          </p:cNvPr>
+          <p:cNvSpPr txBox="1"/>
+          <p:nvPr/>
+        </p:nvSpPr>
+        <p:spPr>
+          <a:xfrm>
+            <a:off x="1961735" y="2904904"/>
+            <a:ext cx="795089" cy="430887"/>
+          </a:xfrm>
+          <a:prstGeom prst="rect">
+            <a:avLst/>
+          </a:prstGeom>
+          <a:noFill/>
+        </p:spPr>
+        <p:txBody>
+          <a:bodyPr wrap="none" lIns="0" tIns="0" rIns="0" bIns="0" rtlCol="0">
+            <a:spAutoFit/>
+          </a:bodyPr>
+          <a:lstStyle/>
+          <a:p>
+            <a:r>
+              <a:rPr lang="en-US" sz="2800" dirty="0">
+                <a:latin typeface="Cambria" panose="02040503050406030204" pitchFamily="18" charset="0"/>
+              </a:rPr>
+              <a:t>4000</a:t>
+            </a:r>
+            <a:endParaRPr lang="en-US" sz="2400" baseline="30000" dirty="0">
+              <a:latin typeface="Cambria" panose="02040503050406030204" pitchFamily="18" charset="0"/>
+            </a:endParaRPr>
+          </a:p>
+        </p:txBody>
+      </p:sp>
+      <p:sp>
+        <p:nvSpPr>
+          <p:cNvPr id="23" name="TextBox 22">
+            <a:extLst>
+              <a:ext uri="{FF2B5EF4-FFF2-40B4-BE49-F238E27FC236}">
+                <a16:creationId xmlns:a16="http://schemas.microsoft.com/office/drawing/2014/main" id="{AF2F610D-38E0-AF6D-AC05-D093D8F71D3D}"/>
+              </a:ext>
+            </a:extLst>
+          </p:cNvPr>
+          <p:cNvSpPr txBox="1"/>
+          <p:nvPr/>
+        </p:nvSpPr>
+        <p:spPr>
+          <a:xfrm>
+            <a:off x="1961735" y="2363416"/>
+            <a:ext cx="795089" cy="430887"/>
+          </a:xfrm>
+          <a:prstGeom prst="rect">
+            <a:avLst/>
+          </a:prstGeom>
+          <a:noFill/>
+        </p:spPr>
+        <p:txBody>
+          <a:bodyPr wrap="none" lIns="0" tIns="0" rIns="0" bIns="0" rtlCol="0">
+            <a:spAutoFit/>
+          </a:bodyPr>
+          <a:lstStyle/>
+          <a:p>
+            <a:r>
+              <a:rPr lang="en-US" sz="2800" dirty="0">
+                <a:latin typeface="Cambria" panose="02040503050406030204" pitchFamily="18" charset="0"/>
+              </a:rPr>
+              <a:t>5000</a:t>
+            </a:r>
+            <a:endParaRPr lang="en-US" sz="2400" baseline="30000" dirty="0">
+              <a:latin typeface="Cambria" panose="02040503050406030204" pitchFamily="18" charset="0"/>
+            </a:endParaRPr>
+          </a:p>
+        </p:txBody>
+      </p:sp>
+      <p:sp>
+        <p:nvSpPr>
+          <p:cNvPr id="24" name="TextBox 23">
+            <a:extLst>
+              <a:ext uri="{FF2B5EF4-FFF2-40B4-BE49-F238E27FC236}">
+                <a16:creationId xmlns:a16="http://schemas.microsoft.com/office/drawing/2014/main" id="{F157FE5F-2717-B636-7324-B4C4C17BF65C}"/>
+              </a:ext>
+            </a:extLst>
+          </p:cNvPr>
+          <p:cNvSpPr txBox="1"/>
+          <p:nvPr/>
+        </p:nvSpPr>
+        <p:spPr>
+          <a:xfrm>
+            <a:off x="1961735" y="1821928"/>
+            <a:ext cx="795089" cy="430887"/>
+          </a:xfrm>
+          <a:prstGeom prst="rect">
+            <a:avLst/>
+          </a:prstGeom>
+          <a:noFill/>
+        </p:spPr>
+        <p:txBody>
+          <a:bodyPr wrap="none" lIns="0" tIns="0" rIns="0" bIns="0" rtlCol="0">
+            <a:spAutoFit/>
+          </a:bodyPr>
+          <a:lstStyle/>
+          <a:p>
+            <a:r>
+              <a:rPr lang="en-US" sz="2800" dirty="0">
+                <a:latin typeface="Cambria" panose="02040503050406030204" pitchFamily="18" charset="0"/>
+              </a:rPr>
+              <a:t>6000</a:t>
+            </a:r>
+            <a:endParaRPr lang="en-US" sz="2400" baseline="30000" dirty="0">
+              <a:latin typeface="Cambria" panose="02040503050406030204" pitchFamily="18" charset="0"/>
+            </a:endParaRPr>
+          </a:p>
+        </p:txBody>
+      </p:sp>
+      <p:sp>
+        <p:nvSpPr>
+          <p:cNvPr id="25" name="TextBox 24">
+            <a:extLst>
+              <a:ext uri="{FF2B5EF4-FFF2-40B4-BE49-F238E27FC236}">
+                <a16:creationId xmlns:a16="http://schemas.microsoft.com/office/drawing/2014/main" id="{F03756AB-15D8-5596-9FC2-0ABAC16E829A}"/>
+              </a:ext>
+            </a:extLst>
+          </p:cNvPr>
+          <p:cNvSpPr txBox="1"/>
+          <p:nvPr/>
+        </p:nvSpPr>
+        <p:spPr>
+          <a:xfrm>
+            <a:off x="1961735" y="1280440"/>
+            <a:ext cx="795089" cy="430887"/>
+          </a:xfrm>
+          <a:prstGeom prst="rect">
+            <a:avLst/>
+          </a:prstGeom>
+          <a:noFill/>
+        </p:spPr>
+        <p:txBody>
+          <a:bodyPr wrap="none" lIns="0" tIns="0" rIns="0" bIns="0" rtlCol="0">
+            <a:spAutoFit/>
+          </a:bodyPr>
+          <a:lstStyle/>
+          <a:p>
+            <a:r>
+              <a:rPr lang="en-US" sz="2800" dirty="0">
+                <a:latin typeface="Cambria" panose="02040503050406030204" pitchFamily="18" charset="0"/>
+              </a:rPr>
+              <a:t>7000</a:t>
+            </a:r>
+            <a:endParaRPr lang="en-US" sz="2400" baseline="30000" dirty="0">
+              <a:latin typeface="Cambria" panose="02040503050406030204" pitchFamily="18" charset="0"/>
+            </a:endParaRPr>
+          </a:p>
+        </p:txBody>
+      </p:sp>
+    </p:spTree>
+    <p:extLst>
+      <p:ext uri="{BB962C8B-B14F-4D97-AF65-F5344CB8AC3E}">
+        <p14:creationId xmlns:p14="http://schemas.microsoft.com/office/powerpoint/2010/main" val="2283491331"/>
+      </p:ext>
+    </p:extLst>
+  </p:cSld>
+  <p:clrMapOvr>
+    <a:masterClrMapping/>
+  </p:clrMapOvr>
+</p:sld>
+</file>
+
+<file path=ppt/slides/slide5.xml><?xml version="1.0" encoding="utf-8"?>
+<p:sld xmlns:a="http://schemas.openxmlformats.org/drawingml/2006/main" xmlns:r="http://schemas.openxmlformats.org/officeDocument/2006/relationships" xmlns:p="http://schemas.openxmlformats.org/presentationml/2006/main">
+  <p:cSld>
+    <p:spTree>
+      <p:nvGrpSpPr>
+        <p:cNvPr id="1" name=""/>
+        <p:cNvGrpSpPr/>
+        <p:nvPr/>
+      </p:nvGrpSpPr>
+      <p:grpSpPr>
+        <a:xfrm>
+          <a:off x="0" y="0"/>
+          <a:ext cx="0" cy="0"/>
+          <a:chOff x="0" y="0"/>
+          <a:chExt cx="0" cy="0"/>
+        </a:xfrm>
+      </p:grpSpPr>
+      <p:sp>
+        <p:nvSpPr>
+          <p:cNvPr id="62" name="TextBox 61">
+            <a:extLst>
+              <a:ext uri="{FF2B5EF4-FFF2-40B4-BE49-F238E27FC236}">
+                <a16:creationId xmlns:a16="http://schemas.microsoft.com/office/drawing/2014/main" id="{96CAF229-2FF7-7E51-42EE-3E688EA0A7C5}"/>
+              </a:ext>
+            </a:extLst>
+          </p:cNvPr>
+          <p:cNvSpPr txBox="1"/>
+          <p:nvPr/>
+        </p:nvSpPr>
+        <p:spPr>
+          <a:xfrm>
+            <a:off x="2949127" y="5307764"/>
+            <a:ext cx="1672830" cy="769441"/>
+          </a:xfrm>
+          <a:prstGeom prst="rect">
+            <a:avLst/>
+          </a:prstGeom>
+          <a:noFill/>
+        </p:spPr>
+        <p:txBody>
+          <a:bodyPr wrap="none" rtlCol="0">
+            <a:spAutoFit/>
+          </a:bodyPr>
+          <a:lstStyle/>
+          <a:p>
+            <a:pPr algn="ctr"/>
+            <a:r>
+              <a:rPr lang="en-US" sz="2200" b="1" dirty="0">
+                <a:latin typeface="Cambria" panose="02040503050406030204" pitchFamily="18" charset="0"/>
+              </a:rPr>
+              <a:t>D1</a:t>
+            </a:r>
+          </a:p>
+          <a:p>
+            <a:pPr algn="ctr"/>
+            <a:r>
+              <a:rPr lang="en-US" sz="2200" b="1" dirty="0">
+                <a:latin typeface="Cambria" panose="02040503050406030204" pitchFamily="18" charset="0"/>
+              </a:rPr>
+              <a:t>SARS-CoV-2</a:t>
+            </a:r>
+          </a:p>
+        </p:txBody>
+      </p:sp>
+      <p:sp>
+        <p:nvSpPr>
+          <p:cNvPr id="109" name="TextBox 108">
+            <a:extLst>
+              <a:ext uri="{FF2B5EF4-FFF2-40B4-BE49-F238E27FC236}">
+                <a16:creationId xmlns:a16="http://schemas.microsoft.com/office/drawing/2014/main" id="{0B8D124A-38A0-D097-02F7-F0520F16847F}"/>
+              </a:ext>
+            </a:extLst>
+          </p:cNvPr>
+          <p:cNvSpPr txBox="1"/>
+          <p:nvPr/>
+        </p:nvSpPr>
+        <p:spPr>
+          <a:xfrm>
+            <a:off x="10825150" y="5307764"/>
+            <a:ext cx="1723445" cy="769441"/>
+          </a:xfrm>
+          <a:prstGeom prst="rect">
+            <a:avLst/>
+          </a:prstGeom>
+          <a:noFill/>
+        </p:spPr>
+        <p:txBody>
+          <a:bodyPr wrap="square" rtlCol="0">
+            <a:spAutoFit/>
+          </a:bodyPr>
+          <a:lstStyle/>
+          <a:p>
+            <a:pPr algn="ctr"/>
+            <a:r>
+              <a:rPr lang="en-US" sz="2200" b="1" dirty="0">
+                <a:latin typeface="Cambria" panose="02040503050406030204" pitchFamily="18" charset="0"/>
+              </a:rPr>
+              <a:t>D4</a:t>
+            </a:r>
+          </a:p>
+          <a:p>
+            <a:pPr algn="ctr"/>
+            <a:r>
+              <a:rPr lang="en-US" sz="2200" b="1" dirty="0">
+                <a:latin typeface="Cambria" panose="02040503050406030204" pitchFamily="18" charset="0"/>
+              </a:rPr>
+              <a:t>Green Algae</a:t>
+            </a:r>
+          </a:p>
+        </p:txBody>
+      </p:sp>
+      <p:sp>
+        <p:nvSpPr>
+          <p:cNvPr id="112" name="TextBox 111">
+            <a:extLst>
+              <a:ext uri="{FF2B5EF4-FFF2-40B4-BE49-F238E27FC236}">
+                <a16:creationId xmlns:a16="http://schemas.microsoft.com/office/drawing/2014/main" id="{21C54195-1BC0-7198-39E9-746027482C71}"/>
+              </a:ext>
+            </a:extLst>
+          </p:cNvPr>
+          <p:cNvSpPr txBox="1"/>
+          <p:nvPr/>
+        </p:nvSpPr>
+        <p:spPr>
+          <a:xfrm>
+            <a:off x="13759378" y="5307764"/>
+            <a:ext cx="1128835" cy="769441"/>
+          </a:xfrm>
+          <a:prstGeom prst="rect">
+            <a:avLst/>
+          </a:prstGeom>
+          <a:noFill/>
+        </p:spPr>
+        <p:txBody>
+          <a:bodyPr wrap="none" rtlCol="0">
+            <a:spAutoFit/>
+          </a:bodyPr>
+          <a:lstStyle/>
+          <a:p>
+            <a:pPr algn="ctr"/>
+            <a:r>
+              <a:rPr lang="en-US" sz="2200" b="1" dirty="0">
+                <a:latin typeface="Cambria" panose="02040503050406030204" pitchFamily="18" charset="0"/>
+              </a:rPr>
+              <a:t>D5</a:t>
+            </a:r>
+          </a:p>
+          <a:p>
+            <a:pPr algn="ctr"/>
+            <a:r>
+              <a:rPr lang="en-US" sz="2200" b="1" dirty="0">
+                <a:latin typeface="Cambria" panose="02040503050406030204" pitchFamily="18" charset="0"/>
+              </a:rPr>
+              <a:t>Human</a:t>
+            </a:r>
+          </a:p>
+        </p:txBody>
+      </p:sp>
+      <p:sp>
+        <p:nvSpPr>
+          <p:cNvPr id="18" name="TextBox 17">
+            <a:extLst>
+              <a:ext uri="{FF2B5EF4-FFF2-40B4-BE49-F238E27FC236}">
+                <a16:creationId xmlns:a16="http://schemas.microsoft.com/office/drawing/2014/main" id="{27D0DFC1-079C-D227-33BF-A2ACDD264B77}"/>
+              </a:ext>
+            </a:extLst>
+          </p:cNvPr>
+          <p:cNvSpPr txBox="1"/>
+          <p:nvPr/>
+        </p:nvSpPr>
+        <p:spPr>
+          <a:xfrm>
+            <a:off x="5948463" y="5307764"/>
+            <a:ext cx="942694" cy="769441"/>
+          </a:xfrm>
+          <a:prstGeom prst="rect">
+            <a:avLst/>
+          </a:prstGeom>
+          <a:noFill/>
+        </p:spPr>
+        <p:txBody>
+          <a:bodyPr wrap="none" rtlCol="0">
+            <a:spAutoFit/>
+          </a:bodyPr>
+          <a:lstStyle/>
+          <a:p>
+            <a:pPr algn="ctr"/>
+            <a:r>
+              <a:rPr lang="en-US" sz="2200" b="1" dirty="0">
+                <a:latin typeface="Cambria" panose="02040503050406030204" pitchFamily="18" charset="0"/>
+              </a:rPr>
+              <a:t>D2</a:t>
+            </a:r>
+          </a:p>
+          <a:p>
+            <a:pPr algn="ctr"/>
+            <a:r>
+              <a:rPr lang="en-US" sz="2200" b="1" dirty="0">
+                <a:latin typeface="Cambria" panose="02040503050406030204" pitchFamily="18" charset="0"/>
+              </a:rPr>
+              <a:t>E. coli</a:t>
+            </a:r>
+          </a:p>
+        </p:txBody>
+      </p:sp>
+      <p:sp>
+        <p:nvSpPr>
+          <p:cNvPr id="19" name="TextBox 18">
+            <a:extLst>
+              <a:ext uri="{FF2B5EF4-FFF2-40B4-BE49-F238E27FC236}">
+                <a16:creationId xmlns:a16="http://schemas.microsoft.com/office/drawing/2014/main" id="{4EE6EC74-399E-623E-683D-91D67EC0EC85}"/>
+              </a:ext>
+            </a:extLst>
+          </p:cNvPr>
+          <p:cNvSpPr txBox="1"/>
+          <p:nvPr/>
+        </p:nvSpPr>
+        <p:spPr>
+          <a:xfrm>
+            <a:off x="8627299" y="5307764"/>
+            <a:ext cx="861967" cy="769441"/>
+          </a:xfrm>
+          <a:prstGeom prst="rect">
+            <a:avLst/>
+          </a:prstGeom>
+          <a:noFill/>
+        </p:spPr>
+        <p:txBody>
+          <a:bodyPr wrap="none" rtlCol="0">
+            <a:spAutoFit/>
+          </a:bodyPr>
+          <a:lstStyle/>
+          <a:p>
+            <a:pPr algn="ctr"/>
+            <a:r>
+              <a:rPr lang="en-US" sz="2200" b="1" dirty="0">
+                <a:latin typeface="Cambria" panose="02040503050406030204" pitchFamily="18" charset="0"/>
+              </a:rPr>
+              <a:t>D3</a:t>
+            </a:r>
+          </a:p>
+          <a:p>
+            <a:pPr algn="ctr"/>
+            <a:r>
+              <a:rPr lang="en-US" sz="2200" b="1" dirty="0">
+                <a:latin typeface="Cambria" panose="02040503050406030204" pitchFamily="18" charset="0"/>
+              </a:rPr>
+              <a:t>Yeast</a:t>
+            </a:r>
+          </a:p>
+        </p:txBody>
+      </p:sp>
+      <p:sp>
+        <p:nvSpPr>
+          <p:cNvPr id="5" name="TextBox 4">
+            <a:extLst>
+              <a:ext uri="{FF2B5EF4-FFF2-40B4-BE49-F238E27FC236}">
+                <a16:creationId xmlns:a16="http://schemas.microsoft.com/office/drawing/2014/main" id="{E4862BF3-9618-6956-E1A9-EA2DE9EC6970}"/>
+              </a:ext>
+            </a:extLst>
+          </p:cNvPr>
+          <p:cNvSpPr txBox="1"/>
+          <p:nvPr/>
+        </p:nvSpPr>
+        <p:spPr>
+          <a:xfrm rot="16200000">
+            <a:off x="-110757" y="2820135"/>
+            <a:ext cx="3796950" cy="800219"/>
+          </a:xfrm>
+          <a:prstGeom prst="rect">
+            <a:avLst/>
+          </a:prstGeom>
+          <a:noFill/>
+        </p:spPr>
+        <p:txBody>
+          <a:bodyPr wrap="square" lIns="0" tIns="0" rIns="0" bIns="0" rtlCol="0">
+            <a:spAutoFit/>
+          </a:bodyPr>
+          <a:lstStyle/>
+          <a:p>
+            <a:pPr algn="ctr"/>
+            <a:r>
+              <a:rPr lang="en-US" sz="2600" b="1" dirty="0">
+                <a:latin typeface="Cambria" panose="02040503050406030204" pitchFamily="18" charset="0"/>
+              </a:rPr>
+              <a:t>Average Sequenced Chunks per Read (#)</a:t>
+            </a:r>
+          </a:p>
+        </p:txBody>
+      </p:sp>
+      <p:pic>
+        <p:nvPicPr>
+          <p:cNvPr id="4" name="Picture 3">
+            <a:extLst>
+              <a:ext uri="{FF2B5EF4-FFF2-40B4-BE49-F238E27FC236}">
+                <a16:creationId xmlns:a16="http://schemas.microsoft.com/office/drawing/2014/main" id="{635D8080-B02A-50C5-6025-8CC7DCEC9FEB}"/>
+              </a:ext>
+            </a:extLst>
+          </p:cNvPr>
+          <p:cNvPicPr>
+            <a:picLocks noChangeAspect="1"/>
+          </p:cNvPicPr>
+          <p:nvPr/>
+        </p:nvPicPr>
+        <p:blipFill>
+          <a:blip r:embed="rId3">
+            <a:extLst>
+              <a:ext uri="{28A0092B-C50C-407E-A947-70E740481C1C}">
+                <a14:useLocalDpi xmlns:a14="http://schemas.microsoft.com/office/drawing/2010/main" val="0"/>
+              </a:ext>
+            </a:extLst>
+          </a:blip>
+          <a:srcRect/>
+          <a:stretch/>
+        </p:blipFill>
+        <p:spPr>
+          <a:xfrm>
+            <a:off x="2727519" y="1111180"/>
+            <a:ext cx="12654387" cy="4218129"/>
+          </a:xfrm>
+          <a:prstGeom prst="rect">
+            <a:avLst/>
+          </a:prstGeom>
+        </p:spPr>
+      </p:pic>
+      <p:sp>
+        <p:nvSpPr>
+          <p:cNvPr id="13" name="TextBox 12">
+            <a:extLst>
+              <a:ext uri="{FF2B5EF4-FFF2-40B4-BE49-F238E27FC236}">
+                <a16:creationId xmlns:a16="http://schemas.microsoft.com/office/drawing/2014/main" id="{865CAA05-04A9-47CA-9F71-3D0E31FA797B}"/>
+              </a:ext>
+            </a:extLst>
+          </p:cNvPr>
+          <p:cNvSpPr txBox="1"/>
+          <p:nvPr/>
+        </p:nvSpPr>
+        <p:spPr>
+          <a:xfrm>
+            <a:off x="2505518" y="4465921"/>
+            <a:ext cx="198772" cy="430887"/>
+          </a:xfrm>
+          <a:prstGeom prst="rect">
+            <a:avLst/>
+          </a:prstGeom>
+          <a:noFill/>
+        </p:spPr>
+        <p:txBody>
+          <a:bodyPr wrap="none" lIns="0" tIns="0" rIns="0" bIns="0" rtlCol="0">
+            <a:spAutoFit/>
+          </a:bodyPr>
+          <a:lstStyle/>
+          <a:p>
+            <a:r>
+              <a:rPr lang="en-US" sz="2800" dirty="0">
+                <a:latin typeface="Cambria" panose="02040503050406030204" pitchFamily="18" charset="0"/>
+              </a:rPr>
+              <a:t>2</a:t>
+            </a:r>
+            <a:endParaRPr lang="en-US" sz="2400" baseline="30000" dirty="0">
+              <a:latin typeface="Cambria" panose="02040503050406030204" pitchFamily="18" charset="0"/>
+            </a:endParaRPr>
+          </a:p>
+        </p:txBody>
+      </p:sp>
+      <p:grpSp>
+        <p:nvGrpSpPr>
+          <p:cNvPr id="28" name="Group 27">
+            <a:extLst>
+              <a:ext uri="{FF2B5EF4-FFF2-40B4-BE49-F238E27FC236}">
+                <a16:creationId xmlns:a16="http://schemas.microsoft.com/office/drawing/2014/main" id="{4973AE2D-87AF-4292-24B9-D4D177AC210A}"/>
+              </a:ext>
+            </a:extLst>
+          </p:cNvPr>
+          <p:cNvGrpSpPr/>
+          <p:nvPr/>
+        </p:nvGrpSpPr>
+        <p:grpSpPr>
+          <a:xfrm>
+            <a:off x="7137438" y="571027"/>
+            <a:ext cx="3834549" cy="523220"/>
+            <a:chOff x="5821436" y="567362"/>
+            <a:chExt cx="3834549" cy="523220"/>
+          </a:xfrm>
+        </p:grpSpPr>
+        <p:grpSp>
+          <p:nvGrpSpPr>
+            <p:cNvPr id="8" name="Group 7">
+              <a:extLst>
+                <a:ext uri="{FF2B5EF4-FFF2-40B4-BE49-F238E27FC236}">
+                  <a16:creationId xmlns:a16="http://schemas.microsoft.com/office/drawing/2014/main" id="{4BAD3F6A-F509-83E6-2991-8DEE6713CA78}"/>
+                </a:ext>
+              </a:extLst>
+            </p:cNvPr>
+            <p:cNvGrpSpPr/>
+            <p:nvPr/>
+          </p:nvGrpSpPr>
+          <p:grpSpPr>
+            <a:xfrm>
+              <a:off x="5821436" y="567362"/>
+              <a:ext cx="1944439" cy="523220"/>
+              <a:chOff x="3780870" y="184920"/>
+              <a:chExt cx="1944439" cy="523220"/>
+            </a:xfrm>
+          </p:grpSpPr>
+          <p:sp>
+            <p:nvSpPr>
+              <p:cNvPr id="82" name="Rectangle 81">
+                <a:extLst>
+                  <a:ext uri="{FF2B5EF4-FFF2-40B4-BE49-F238E27FC236}">
+                    <a16:creationId xmlns:a16="http://schemas.microsoft.com/office/drawing/2014/main" id="{FD3CF857-F05E-1745-C00B-A9EAB23F2DA3}"/>
+                  </a:ext>
+                </a:extLst>
+              </p:cNvPr>
+              <p:cNvSpPr/>
+              <p:nvPr/>
+            </p:nvSpPr>
+            <p:spPr>
+              <a:xfrm>
+                <a:off x="3780870" y="319463"/>
+                <a:ext cx="288000" cy="288000"/>
+              </a:xfrm>
+              <a:prstGeom prst="rect">
+                <a:avLst/>
+              </a:prstGeom>
+              <a:solidFill>
+                <a:srgbClr val="6799CE"/>
+              </a:solidFill>
+            </p:spPr>
+            <p:style>
+              <a:lnRef idx="2">
+                <a:schemeClr val="accent1">
+                  <a:shade val="50000"/>
+                </a:schemeClr>
+              </a:lnRef>
+              <a:fillRef idx="1">
+                <a:schemeClr val="accent1"/>
+              </a:fillRef>
+              <a:effectRef idx="0">
+                <a:schemeClr val="accent1"/>
+              </a:effectRef>
+              <a:fontRef idx="minor">
+                <a:schemeClr val="lt1"/>
+              </a:fontRef>
+            </p:style>
+            <p:txBody>
+              <a:bodyPr rtlCol="0" anchor="ctr"/>
+              <a:lstStyle/>
+              <a:p>
+                <a:pPr algn="ctr"/>
+                <a:endParaRPr lang="en-US" sz="2800" dirty="0">
+                  <a:latin typeface="Cambria" panose="02040503050406030204" pitchFamily="18" charset="0"/>
+                </a:endParaRPr>
+              </a:p>
+            </p:txBody>
+          </p:sp>
+          <p:sp>
+            <p:nvSpPr>
+              <p:cNvPr id="83" name="TextBox 82">
+                <a:extLst>
+                  <a:ext uri="{FF2B5EF4-FFF2-40B4-BE49-F238E27FC236}">
+                    <a16:creationId xmlns:a16="http://schemas.microsoft.com/office/drawing/2014/main" id="{4F007CFC-AA25-432F-4AE1-4434ACA1316E}"/>
+                  </a:ext>
+                </a:extLst>
+              </p:cNvPr>
+              <p:cNvSpPr txBox="1"/>
+              <p:nvPr/>
+            </p:nvSpPr>
+            <p:spPr>
+              <a:xfrm>
+                <a:off x="4099095" y="184920"/>
+                <a:ext cx="1626214" cy="523220"/>
+              </a:xfrm>
+              <a:prstGeom prst="rect">
+                <a:avLst/>
+              </a:prstGeom>
+              <a:noFill/>
+            </p:spPr>
+            <p:txBody>
+              <a:bodyPr wrap="none" rtlCol="0">
+                <a:spAutoFit/>
+              </a:bodyPr>
+              <a:lstStyle/>
+              <a:p>
+                <a:pPr algn="ctr"/>
+                <a:r>
+                  <a:rPr lang="en-US" sz="2800" dirty="0" err="1">
+                    <a:latin typeface="Cambria" panose="02040503050406030204" pitchFamily="18" charset="0"/>
+                  </a:rPr>
+                  <a:t>RawHash</a:t>
+                </a:r>
+                <a:endParaRPr lang="en-US" sz="2800" dirty="0">
+                  <a:latin typeface="Cambria" panose="02040503050406030204" pitchFamily="18" charset="0"/>
+                </a:endParaRPr>
+              </a:p>
+            </p:txBody>
+          </p:sp>
+        </p:grpSp>
+        <p:grpSp>
+          <p:nvGrpSpPr>
+            <p:cNvPr id="14" name="Group 13">
+              <a:extLst>
+                <a:ext uri="{FF2B5EF4-FFF2-40B4-BE49-F238E27FC236}">
+                  <a16:creationId xmlns:a16="http://schemas.microsoft.com/office/drawing/2014/main" id="{3AB95315-0052-63BF-1A79-C925E0D836F2}"/>
+                </a:ext>
+              </a:extLst>
+            </p:cNvPr>
+            <p:cNvGrpSpPr/>
+            <p:nvPr/>
+          </p:nvGrpSpPr>
+          <p:grpSpPr>
+            <a:xfrm>
+              <a:off x="8047195" y="567362"/>
+              <a:ext cx="1608790" cy="523220"/>
+              <a:chOff x="3780870" y="231719"/>
+              <a:chExt cx="1608790" cy="523220"/>
+            </a:xfrm>
+          </p:grpSpPr>
+          <p:sp>
+            <p:nvSpPr>
+              <p:cNvPr id="15" name="Rectangle 14">
+                <a:extLst>
+                  <a:ext uri="{FF2B5EF4-FFF2-40B4-BE49-F238E27FC236}">
+                    <a16:creationId xmlns:a16="http://schemas.microsoft.com/office/drawing/2014/main" id="{D70396FF-403B-FFA8-75A5-52BC407761B0}"/>
+                  </a:ext>
+                </a:extLst>
+              </p:cNvPr>
+              <p:cNvSpPr/>
+              <p:nvPr/>
+            </p:nvSpPr>
+            <p:spPr>
+              <a:xfrm>
+                <a:off x="3780870" y="366262"/>
+                <a:ext cx="288000" cy="288000"/>
+              </a:xfrm>
+              <a:prstGeom prst="rect">
+                <a:avLst/>
+              </a:prstGeom>
+              <a:solidFill>
+                <a:srgbClr val="DB8042"/>
+              </a:solidFill>
+            </p:spPr>
+            <p:style>
+              <a:lnRef idx="2">
+                <a:schemeClr val="accent1">
+                  <a:shade val="50000"/>
+                </a:schemeClr>
+              </a:lnRef>
+              <a:fillRef idx="1">
+                <a:schemeClr val="accent1"/>
+              </a:fillRef>
+              <a:effectRef idx="0">
+                <a:schemeClr val="accent1"/>
+              </a:effectRef>
+              <a:fontRef idx="minor">
+                <a:schemeClr val="lt1"/>
+              </a:fontRef>
+            </p:style>
+            <p:txBody>
+              <a:bodyPr rtlCol="0" anchor="ctr"/>
+              <a:lstStyle/>
+              <a:p>
+                <a:pPr algn="ctr"/>
+                <a:endParaRPr lang="en-US" sz="2800" dirty="0">
+                  <a:latin typeface="Cambria" panose="02040503050406030204" pitchFamily="18" charset="0"/>
+                </a:endParaRPr>
+              </a:p>
+            </p:txBody>
+          </p:sp>
+          <p:sp>
+            <p:nvSpPr>
+              <p:cNvPr id="16" name="TextBox 15">
+                <a:extLst>
+                  <a:ext uri="{FF2B5EF4-FFF2-40B4-BE49-F238E27FC236}">
+                    <a16:creationId xmlns:a16="http://schemas.microsoft.com/office/drawing/2014/main" id="{0BCF6713-B3FD-2DAF-EEAA-DADBC32A447A}"/>
+                  </a:ext>
+                </a:extLst>
+              </p:cNvPr>
+              <p:cNvSpPr txBox="1"/>
+              <p:nvPr/>
+            </p:nvSpPr>
+            <p:spPr>
+              <a:xfrm>
+                <a:off x="4076479" y="231719"/>
+                <a:ext cx="1313181" cy="523220"/>
+              </a:xfrm>
+              <a:prstGeom prst="rect">
+                <a:avLst/>
+              </a:prstGeom>
+              <a:noFill/>
+            </p:spPr>
+            <p:txBody>
+              <a:bodyPr wrap="none" rtlCol="0">
+                <a:spAutoFit/>
+              </a:bodyPr>
+              <a:lstStyle/>
+              <a:p>
+                <a:pPr algn="ctr"/>
+                <a:r>
+                  <a:rPr lang="en-US" sz="2800" dirty="0" err="1">
+                    <a:latin typeface="Cambria" panose="02040503050406030204" pitchFamily="18" charset="0"/>
+                  </a:rPr>
+                  <a:t>Sigmap</a:t>
+                </a:r>
+                <a:endParaRPr lang="en-US" sz="2800" dirty="0">
+                  <a:latin typeface="Cambria" panose="02040503050406030204" pitchFamily="18" charset="0"/>
+                </a:endParaRPr>
+              </a:p>
+            </p:txBody>
+          </p:sp>
+        </p:grpSp>
+      </p:grpSp>
+      <p:sp>
+        <p:nvSpPr>
+          <p:cNvPr id="2" name="TextBox 1">
+            <a:extLst>
+              <a:ext uri="{FF2B5EF4-FFF2-40B4-BE49-F238E27FC236}">
+                <a16:creationId xmlns:a16="http://schemas.microsoft.com/office/drawing/2014/main" id="{D33B48EB-2ADD-ED01-FDD9-F833C8174065}"/>
+              </a:ext>
+            </a:extLst>
+          </p:cNvPr>
+          <p:cNvSpPr txBox="1"/>
+          <p:nvPr/>
+        </p:nvSpPr>
+        <p:spPr>
+          <a:xfrm>
+            <a:off x="2505518" y="3852213"/>
+            <a:ext cx="198772" cy="430887"/>
+          </a:xfrm>
+          <a:prstGeom prst="rect">
+            <a:avLst/>
+          </a:prstGeom>
+          <a:noFill/>
+        </p:spPr>
+        <p:txBody>
+          <a:bodyPr wrap="none" lIns="0" tIns="0" rIns="0" bIns="0" rtlCol="0">
+            <a:spAutoFit/>
+          </a:bodyPr>
+          <a:lstStyle/>
+          <a:p>
+            <a:r>
+              <a:rPr lang="en-US" sz="2800" dirty="0">
+                <a:latin typeface="Cambria" panose="02040503050406030204" pitchFamily="18" charset="0"/>
+              </a:rPr>
+              <a:t>4</a:t>
+            </a:r>
+            <a:endParaRPr lang="en-US" sz="2400" baseline="30000" dirty="0">
+              <a:latin typeface="Cambria" panose="02040503050406030204" pitchFamily="18" charset="0"/>
+            </a:endParaRPr>
+          </a:p>
+        </p:txBody>
+      </p:sp>
+      <p:sp>
+        <p:nvSpPr>
+          <p:cNvPr id="9" name="TextBox 8">
+            <a:extLst>
+              <a:ext uri="{FF2B5EF4-FFF2-40B4-BE49-F238E27FC236}">
+                <a16:creationId xmlns:a16="http://schemas.microsoft.com/office/drawing/2014/main" id="{DA69F3CE-7D15-E2FA-29AD-4077E361F1F2}"/>
+              </a:ext>
+            </a:extLst>
+          </p:cNvPr>
+          <p:cNvSpPr txBox="1"/>
+          <p:nvPr/>
+        </p:nvSpPr>
+        <p:spPr>
+          <a:xfrm>
+            <a:off x="2505518" y="3238506"/>
+            <a:ext cx="198772" cy="430887"/>
+          </a:xfrm>
+          <a:prstGeom prst="rect">
+            <a:avLst/>
+          </a:prstGeom>
+          <a:noFill/>
+        </p:spPr>
+        <p:txBody>
+          <a:bodyPr wrap="none" lIns="0" tIns="0" rIns="0" bIns="0" rtlCol="0">
+            <a:spAutoFit/>
+          </a:bodyPr>
+          <a:lstStyle/>
+          <a:p>
+            <a:r>
+              <a:rPr lang="en-US" sz="2800" dirty="0">
+                <a:latin typeface="Cambria" panose="02040503050406030204" pitchFamily="18" charset="0"/>
+              </a:rPr>
+              <a:t>6</a:t>
+            </a:r>
+            <a:endParaRPr lang="en-US" sz="2400" baseline="30000" dirty="0">
+              <a:latin typeface="Cambria" panose="02040503050406030204" pitchFamily="18" charset="0"/>
+            </a:endParaRPr>
+          </a:p>
+        </p:txBody>
+      </p:sp>
+      <p:sp>
+        <p:nvSpPr>
+          <p:cNvPr id="10" name="TextBox 9">
+            <a:extLst>
+              <a:ext uri="{FF2B5EF4-FFF2-40B4-BE49-F238E27FC236}">
+                <a16:creationId xmlns:a16="http://schemas.microsoft.com/office/drawing/2014/main" id="{011FBACF-95D4-30B5-5500-0AEA1AC9608F}"/>
+              </a:ext>
+            </a:extLst>
+          </p:cNvPr>
+          <p:cNvSpPr txBox="1"/>
+          <p:nvPr/>
+        </p:nvSpPr>
+        <p:spPr>
+          <a:xfrm>
+            <a:off x="2505518" y="2624799"/>
+            <a:ext cx="198772" cy="430887"/>
+          </a:xfrm>
+          <a:prstGeom prst="rect">
+            <a:avLst/>
+          </a:prstGeom>
+          <a:noFill/>
+        </p:spPr>
+        <p:txBody>
+          <a:bodyPr wrap="none" lIns="0" tIns="0" rIns="0" bIns="0" rtlCol="0">
+            <a:spAutoFit/>
+          </a:bodyPr>
+          <a:lstStyle/>
+          <a:p>
+            <a:r>
+              <a:rPr lang="en-US" sz="2800" dirty="0">
+                <a:latin typeface="Cambria" panose="02040503050406030204" pitchFamily="18" charset="0"/>
+              </a:rPr>
+              <a:t>8</a:t>
+            </a:r>
+            <a:endParaRPr lang="en-US" sz="2400" baseline="30000" dirty="0">
+              <a:latin typeface="Cambria" panose="02040503050406030204" pitchFamily="18" charset="0"/>
+            </a:endParaRPr>
+          </a:p>
+        </p:txBody>
+      </p:sp>
+      <p:sp>
+        <p:nvSpPr>
+          <p:cNvPr id="23" name="TextBox 22">
+            <a:extLst>
+              <a:ext uri="{FF2B5EF4-FFF2-40B4-BE49-F238E27FC236}">
+                <a16:creationId xmlns:a16="http://schemas.microsoft.com/office/drawing/2014/main" id="{AF2F610D-38E0-AF6D-AC05-D093D8F71D3D}"/>
+              </a:ext>
+            </a:extLst>
+          </p:cNvPr>
+          <p:cNvSpPr txBox="1"/>
+          <p:nvPr/>
+        </p:nvSpPr>
+        <p:spPr>
+          <a:xfrm>
+            <a:off x="2306745" y="2011092"/>
+            <a:ext cx="397545" cy="430887"/>
+          </a:xfrm>
+          <a:prstGeom prst="rect">
+            <a:avLst/>
+          </a:prstGeom>
+          <a:noFill/>
+        </p:spPr>
+        <p:txBody>
+          <a:bodyPr wrap="none" lIns="0" tIns="0" rIns="0" bIns="0" rtlCol="0">
+            <a:spAutoFit/>
+          </a:bodyPr>
+          <a:lstStyle/>
+          <a:p>
+            <a:r>
+              <a:rPr lang="en-US" sz="2800" dirty="0">
+                <a:latin typeface="Cambria" panose="02040503050406030204" pitchFamily="18" charset="0"/>
+              </a:rPr>
+              <a:t>10</a:t>
+            </a:r>
+            <a:endParaRPr lang="en-US" sz="2400" baseline="30000" dirty="0">
+              <a:latin typeface="Cambria" panose="02040503050406030204" pitchFamily="18" charset="0"/>
+            </a:endParaRPr>
+          </a:p>
+        </p:txBody>
+      </p:sp>
+      <p:sp>
+        <p:nvSpPr>
+          <p:cNvPr id="24" name="TextBox 23">
+            <a:extLst>
+              <a:ext uri="{FF2B5EF4-FFF2-40B4-BE49-F238E27FC236}">
+                <a16:creationId xmlns:a16="http://schemas.microsoft.com/office/drawing/2014/main" id="{F157FE5F-2717-B636-7324-B4C4C17BF65C}"/>
+              </a:ext>
+            </a:extLst>
+          </p:cNvPr>
+          <p:cNvSpPr txBox="1"/>
+          <p:nvPr/>
+        </p:nvSpPr>
+        <p:spPr>
+          <a:xfrm>
+            <a:off x="2306745" y="1397385"/>
+            <a:ext cx="397545" cy="430887"/>
+          </a:xfrm>
+          <a:prstGeom prst="rect">
+            <a:avLst/>
+          </a:prstGeom>
+          <a:noFill/>
+        </p:spPr>
+        <p:txBody>
+          <a:bodyPr wrap="none" lIns="0" tIns="0" rIns="0" bIns="0" rtlCol="0">
+            <a:spAutoFit/>
+          </a:bodyPr>
+          <a:lstStyle/>
+          <a:p>
+            <a:r>
+              <a:rPr lang="en-US" sz="2800" dirty="0">
+                <a:latin typeface="Cambria" panose="02040503050406030204" pitchFamily="18" charset="0"/>
+              </a:rPr>
+              <a:t>12</a:t>
+            </a:r>
+            <a:endParaRPr lang="en-US" sz="2400" baseline="30000" dirty="0">
+              <a:latin typeface="Cambria" panose="02040503050406030204" pitchFamily="18" charset="0"/>
+            </a:endParaRPr>
+          </a:p>
+        </p:txBody>
+      </p:sp>
+    </p:spTree>
+    <p:extLst>
+      <p:ext uri="{BB962C8B-B14F-4D97-AF65-F5344CB8AC3E}">
+        <p14:creationId xmlns:p14="http://schemas.microsoft.com/office/powerpoint/2010/main" val="1572357762"/>
       </p:ext>
     </p:extLst>
   </p:cSld>

</xml_diff>